<commit_message>
Created new RT figures for the phenotype. Still have to make the mesocosm ines.
</commit_message>
<xml_diff>
--- a/plots/Figures.pptx
+++ b/plots/Figures.pptx
@@ -210,7 +210,7 @@
           <a:p>
             <a:fld id="{675571A2-4449-6245-B884-D84821FE4B21}" type="datetimeFigureOut">
               <a:rPr lang="en-US" smtClean="0"/>
-              <a:t>3/17/22</a:t>
+              <a:t>3/18/22</a:t>
             </a:fld>
             <a:endParaRPr lang="en-US"/>
           </a:p>
@@ -945,7 +945,7 @@
           <a:p>
             <a:fld id="{C446594C-9C26-1C41-BADB-56C901B363CC}" type="datetimeFigureOut">
               <a:rPr lang="en-US" smtClean="0"/>
-              <a:t>3/17/22</a:t>
+              <a:t>3/18/22</a:t>
             </a:fld>
             <a:endParaRPr lang="en-US"/>
           </a:p>
@@ -1143,7 +1143,7 @@
           <a:p>
             <a:fld id="{C446594C-9C26-1C41-BADB-56C901B363CC}" type="datetimeFigureOut">
               <a:rPr lang="en-US" smtClean="0"/>
-              <a:t>3/17/22</a:t>
+              <a:t>3/18/22</a:t>
             </a:fld>
             <a:endParaRPr lang="en-US"/>
           </a:p>
@@ -1351,7 +1351,7 @@
           <a:p>
             <a:fld id="{C446594C-9C26-1C41-BADB-56C901B363CC}" type="datetimeFigureOut">
               <a:rPr lang="en-US" smtClean="0"/>
-              <a:t>3/17/22</a:t>
+              <a:t>3/18/22</a:t>
             </a:fld>
             <a:endParaRPr lang="en-US"/>
           </a:p>
@@ -1549,7 +1549,7 @@
           <a:p>
             <a:fld id="{C446594C-9C26-1C41-BADB-56C901B363CC}" type="datetimeFigureOut">
               <a:rPr lang="en-US" smtClean="0"/>
-              <a:t>3/17/22</a:t>
+              <a:t>3/18/22</a:t>
             </a:fld>
             <a:endParaRPr lang="en-US"/>
           </a:p>
@@ -1824,7 +1824,7 @@
           <a:p>
             <a:fld id="{C446594C-9C26-1C41-BADB-56C901B363CC}" type="datetimeFigureOut">
               <a:rPr lang="en-US" smtClean="0"/>
-              <a:t>3/17/22</a:t>
+              <a:t>3/18/22</a:t>
             </a:fld>
             <a:endParaRPr lang="en-US"/>
           </a:p>
@@ -2089,7 +2089,7 @@
           <a:p>
             <a:fld id="{C446594C-9C26-1C41-BADB-56C901B363CC}" type="datetimeFigureOut">
               <a:rPr lang="en-US" smtClean="0"/>
-              <a:t>3/17/22</a:t>
+              <a:t>3/18/22</a:t>
             </a:fld>
             <a:endParaRPr lang="en-US"/>
           </a:p>
@@ -2501,7 +2501,7 @@
           <a:p>
             <a:fld id="{C446594C-9C26-1C41-BADB-56C901B363CC}" type="datetimeFigureOut">
               <a:rPr lang="en-US" smtClean="0"/>
-              <a:t>3/17/22</a:t>
+              <a:t>3/18/22</a:t>
             </a:fld>
             <a:endParaRPr lang="en-US"/>
           </a:p>
@@ -2642,7 +2642,7 @@
           <a:p>
             <a:fld id="{C446594C-9C26-1C41-BADB-56C901B363CC}" type="datetimeFigureOut">
               <a:rPr lang="en-US" smtClean="0"/>
-              <a:t>3/17/22</a:t>
+              <a:t>3/18/22</a:t>
             </a:fld>
             <a:endParaRPr lang="en-US"/>
           </a:p>
@@ -2755,7 +2755,7 @@
           <a:p>
             <a:fld id="{C446594C-9C26-1C41-BADB-56C901B363CC}" type="datetimeFigureOut">
               <a:rPr lang="en-US" smtClean="0"/>
-              <a:t>3/17/22</a:t>
+              <a:t>3/18/22</a:t>
             </a:fld>
             <a:endParaRPr lang="en-US"/>
           </a:p>
@@ -3066,7 +3066,7 @@
           <a:p>
             <a:fld id="{C446594C-9C26-1C41-BADB-56C901B363CC}" type="datetimeFigureOut">
               <a:rPr lang="en-US" smtClean="0"/>
-              <a:t>3/17/22</a:t>
+              <a:t>3/18/22</a:t>
             </a:fld>
             <a:endParaRPr lang="en-US"/>
           </a:p>
@@ -3354,7 +3354,7 @@
           <a:p>
             <a:fld id="{C446594C-9C26-1C41-BADB-56C901B363CC}" type="datetimeFigureOut">
               <a:rPr lang="en-US" smtClean="0"/>
-              <a:t>3/17/22</a:t>
+              <a:t>3/18/22</a:t>
             </a:fld>
             <a:endParaRPr lang="en-US"/>
           </a:p>
@@ -3595,7 +3595,7 @@
           <a:p>
             <a:fld id="{C446594C-9C26-1C41-BADB-56C901B363CC}" type="datetimeFigureOut">
               <a:rPr lang="en-US" smtClean="0"/>
-              <a:t>3/17/22</a:t>
+              <a:t>3/18/22</a:t>
             </a:fld>
             <a:endParaRPr lang="en-US"/>
           </a:p>

</xml_diff>

<commit_message>
Fixed graphs & made some changes to the script.
</commit_message>
<xml_diff>
--- a/plots/Figures.pptx
+++ b/plots/Figures.pptx
@@ -210,7 +210,7 @@
           <a:p>
             <a:fld id="{675571A2-4449-6245-B884-D84821FE4B21}" type="datetimeFigureOut">
               <a:rPr lang="en-US" smtClean="0"/>
-              <a:t>3/18/22</a:t>
+              <a:t>4/4/22</a:t>
             </a:fld>
             <a:endParaRPr lang="en-US"/>
           </a:p>
@@ -945,7 +945,7 @@
           <a:p>
             <a:fld id="{C446594C-9C26-1C41-BADB-56C901B363CC}" type="datetimeFigureOut">
               <a:rPr lang="en-US" smtClean="0"/>
-              <a:t>3/18/22</a:t>
+              <a:t>4/4/22</a:t>
             </a:fld>
             <a:endParaRPr lang="en-US"/>
           </a:p>
@@ -1143,7 +1143,7 @@
           <a:p>
             <a:fld id="{C446594C-9C26-1C41-BADB-56C901B363CC}" type="datetimeFigureOut">
               <a:rPr lang="en-US" smtClean="0"/>
-              <a:t>3/18/22</a:t>
+              <a:t>4/4/22</a:t>
             </a:fld>
             <a:endParaRPr lang="en-US"/>
           </a:p>
@@ -1351,7 +1351,7 @@
           <a:p>
             <a:fld id="{C446594C-9C26-1C41-BADB-56C901B363CC}" type="datetimeFigureOut">
               <a:rPr lang="en-US" smtClean="0"/>
-              <a:t>3/18/22</a:t>
+              <a:t>4/4/22</a:t>
             </a:fld>
             <a:endParaRPr lang="en-US"/>
           </a:p>
@@ -1549,7 +1549,7 @@
           <a:p>
             <a:fld id="{C446594C-9C26-1C41-BADB-56C901B363CC}" type="datetimeFigureOut">
               <a:rPr lang="en-US" smtClean="0"/>
-              <a:t>3/18/22</a:t>
+              <a:t>4/4/22</a:t>
             </a:fld>
             <a:endParaRPr lang="en-US"/>
           </a:p>
@@ -1824,7 +1824,7 @@
           <a:p>
             <a:fld id="{C446594C-9C26-1C41-BADB-56C901B363CC}" type="datetimeFigureOut">
               <a:rPr lang="en-US" smtClean="0"/>
-              <a:t>3/18/22</a:t>
+              <a:t>4/4/22</a:t>
             </a:fld>
             <a:endParaRPr lang="en-US"/>
           </a:p>
@@ -2089,7 +2089,7 @@
           <a:p>
             <a:fld id="{C446594C-9C26-1C41-BADB-56C901B363CC}" type="datetimeFigureOut">
               <a:rPr lang="en-US" smtClean="0"/>
-              <a:t>3/18/22</a:t>
+              <a:t>4/4/22</a:t>
             </a:fld>
             <a:endParaRPr lang="en-US"/>
           </a:p>
@@ -2501,7 +2501,7 @@
           <a:p>
             <a:fld id="{C446594C-9C26-1C41-BADB-56C901B363CC}" type="datetimeFigureOut">
               <a:rPr lang="en-US" smtClean="0"/>
-              <a:t>3/18/22</a:t>
+              <a:t>4/4/22</a:t>
             </a:fld>
             <a:endParaRPr lang="en-US"/>
           </a:p>
@@ -2642,7 +2642,7 @@
           <a:p>
             <a:fld id="{C446594C-9C26-1C41-BADB-56C901B363CC}" type="datetimeFigureOut">
               <a:rPr lang="en-US" smtClean="0"/>
-              <a:t>3/18/22</a:t>
+              <a:t>4/4/22</a:t>
             </a:fld>
             <a:endParaRPr lang="en-US"/>
           </a:p>
@@ -2755,7 +2755,7 @@
           <a:p>
             <a:fld id="{C446594C-9C26-1C41-BADB-56C901B363CC}" type="datetimeFigureOut">
               <a:rPr lang="en-US" smtClean="0"/>
-              <a:t>3/18/22</a:t>
+              <a:t>4/4/22</a:t>
             </a:fld>
             <a:endParaRPr lang="en-US"/>
           </a:p>
@@ -3066,7 +3066,7 @@
           <a:p>
             <a:fld id="{C446594C-9C26-1C41-BADB-56C901B363CC}" type="datetimeFigureOut">
               <a:rPr lang="en-US" smtClean="0"/>
-              <a:t>3/18/22</a:t>
+              <a:t>4/4/22</a:t>
             </a:fld>
             <a:endParaRPr lang="en-US"/>
           </a:p>
@@ -3354,7 +3354,7 @@
           <a:p>
             <a:fld id="{C446594C-9C26-1C41-BADB-56C901B363CC}" type="datetimeFigureOut">
               <a:rPr lang="en-US" smtClean="0"/>
-              <a:t>3/18/22</a:t>
+              <a:t>4/4/22</a:t>
             </a:fld>
             <a:endParaRPr lang="en-US"/>
           </a:p>
@@ -3595,7 +3595,7 @@
           <a:p>
             <a:fld id="{C446594C-9C26-1C41-BADB-56C901B363CC}" type="datetimeFigureOut">
               <a:rPr lang="en-US" smtClean="0"/>
-              <a:t>3/18/22</a:t>
+              <a:t>4/4/22</a:t>
             </a:fld>
             <a:endParaRPr lang="en-US"/>
           </a:p>
@@ -11902,8 +11902,8 @@
         </p:nvSpPr>
         <p:spPr>
           <a:xfrm rot="16200000">
-            <a:off x="1577672" y="1986066"/>
-            <a:ext cx="845103" cy="338554"/>
+            <a:off x="1331610" y="1859461"/>
+            <a:ext cx="1337226" cy="338554"/>
           </a:xfrm>
           <a:prstGeom prst="rect">
             <a:avLst/>
@@ -11921,7 +11921,7 @@
                 <a:latin typeface="Arial" panose="020B0604020202020204" pitchFamily="34" charset="0"/>
                 <a:cs typeface="Arial" panose="020B0604020202020204" pitchFamily="34" charset="0"/>
               </a:rPr>
-              <a:t>Fitness</a:t>
+              <a:t>performance</a:t>
             </a:r>
           </a:p>
         </p:txBody>
@@ -12239,8 +12239,8 @@
         </p:nvSpPr>
         <p:spPr>
           <a:xfrm rot="16200000">
-            <a:off x="1418172" y="4081790"/>
-            <a:ext cx="1164101" cy="338554"/>
+            <a:off x="1429393" y="4081790"/>
+            <a:ext cx="1141659" cy="338554"/>
           </a:xfrm>
           <a:prstGeom prst="rect">
             <a:avLst/>
@@ -12258,7 +12258,7 @@
                 <a:latin typeface="Arial" panose="020B0604020202020204" pitchFamily="34" charset="0"/>
                 <a:cs typeface="Arial" panose="020B0604020202020204" pitchFamily="34" charset="0"/>
               </a:rPr>
-              <a:t>Phenotype</a:t>
+              <a:t>phenotype</a:t>
             </a:r>
           </a:p>
         </p:txBody>

</xml_diff>

<commit_message>
Removed the plasticity model code
</commit_message>
<xml_diff>
--- a/plots/Figures.pptx
+++ b/plots/Figures.pptx
@@ -5,12 +5,13 @@
     <p:sldMasterId id="2147483648" r:id="rId1"/>
   </p:sldMasterIdLst>
   <p:notesMasterIdLst>
-    <p:notesMasterId r:id="rId5"/>
+    <p:notesMasterId r:id="rId6"/>
   </p:notesMasterIdLst>
   <p:sldIdLst>
     <p:sldId id="270" r:id="rId2"/>
     <p:sldId id="271" r:id="rId3"/>
     <p:sldId id="256" r:id="rId4"/>
+    <p:sldId id="272" r:id="rId5"/>
   </p:sldIdLst>
   <p:sldSz cx="12192000" cy="6858000"/>
   <p:notesSz cx="6858000" cy="9144000"/>
@@ -210,7 +211,7 @@
           <a:p>
             <a:fld id="{675571A2-4449-6245-B884-D84821FE4B21}" type="datetimeFigureOut">
               <a:rPr lang="en-US" smtClean="0"/>
-              <a:t>4/4/22</a:t>
+              <a:t>6/25/22</a:t>
             </a:fld>
             <a:endParaRPr lang="en-US"/>
           </a:p>
@@ -798,6 +799,142 @@
 </p:notes>
 </file>
 
+<file path=ppt/notesSlides/notesSlide4.xml><?xml version="1.0" encoding="utf-8"?>
+<p:notes xmlns:a="http://schemas.openxmlformats.org/drawingml/2006/main" xmlns:r="http://schemas.openxmlformats.org/officeDocument/2006/relationships" xmlns:p="http://schemas.openxmlformats.org/presentationml/2006/main">
+  <p:cSld>
+    <p:spTree>
+      <p:nvGrpSpPr>
+        <p:cNvPr id="1" name=""/>
+        <p:cNvGrpSpPr/>
+        <p:nvPr/>
+      </p:nvGrpSpPr>
+      <p:grpSpPr>
+        <a:xfrm>
+          <a:off x="0" y="0"/>
+          <a:ext cx="0" cy="0"/>
+          <a:chOff x="0" y="0"/>
+          <a:chExt cx="0" cy="0"/>
+        </a:xfrm>
+      </p:grpSpPr>
+      <p:sp>
+        <p:nvSpPr>
+          <p:cNvPr id="2" name="Slide Image Placeholder 1"/>
+          <p:cNvSpPr>
+            <a:spLocks noGrp="1" noRot="1" noChangeAspect="1"/>
+          </p:cNvSpPr>
+          <p:nvPr>
+            <p:ph type="sldImg"/>
+          </p:nvPr>
+        </p:nvSpPr>
+        <p:spPr/>
+      </p:sp>
+      <p:sp>
+        <p:nvSpPr>
+          <p:cNvPr id="3" name="Notes Placeholder 2"/>
+          <p:cNvSpPr>
+            <a:spLocks noGrp="1"/>
+          </p:cNvSpPr>
+          <p:nvPr>
+            <p:ph type="body" idx="1"/>
+          </p:nvPr>
+        </p:nvSpPr>
+        <p:spPr/>
+        <p:txBody>
+          <a:bodyPr/>
+          <a:lstStyle/>
+          <a:p>
+            <a:r>
+              <a:rPr lang="en-US" dirty="0"/>
+              <a:t>Fig 1. </a:t>
+            </a:r>
+            <a:r>
+              <a:rPr lang="en-CA" sz="1200" b="0" i="0" kern="1200" dirty="0">
+                <a:solidFill>
+                  <a:schemeClr val="tx1"/>
+                </a:solidFill>
+                <a:effectLst/>
+                <a:latin typeface="+mn-lt"/>
+                <a:ea typeface="+mn-ea"/>
+                <a:cs typeface="+mn-cs"/>
+              </a:rPr>
+              <a:t>Predictions associated with the reciprocal transplant (A-D) and mesocosm experiments (E,F). Populations from the Central Coast are indicated in black squares and populations from the Strait of Georgia in grey circles. Acronyms are as follows: Central Coast (CC), Strait of Georgia (</a:t>
+            </a:r>
+            <a:r>
+              <a:rPr lang="en-CA" sz="1200" b="0" i="0" kern="1200" dirty="0" err="1">
+                <a:solidFill>
+                  <a:schemeClr val="tx1"/>
+                </a:solidFill>
+                <a:effectLst/>
+                <a:latin typeface="+mn-lt"/>
+                <a:ea typeface="+mn-ea"/>
+                <a:cs typeface="+mn-cs"/>
+              </a:rPr>
+              <a:t>SoG</a:t>
+            </a:r>
+            <a:r>
+              <a:rPr lang="en-CA" sz="1200" b="0" i="0" kern="1200" dirty="0">
+                <a:solidFill>
+                  <a:schemeClr val="tx1"/>
+                </a:solidFill>
+                <a:effectLst/>
+                <a:latin typeface="+mn-lt"/>
+                <a:ea typeface="+mn-ea"/>
+                <a:cs typeface="+mn-cs"/>
+              </a:rPr>
+              <a:t>), current seawater temperature (CT) and future seawater temperature (FT). Panels A-D show all possible outcomes where populations from both regions perform better (e.g. grow and survive more) when outplanted on the Central Coast relative to the Strait of Georgia. Panel A also shows signals of local adaptation, where populations from each region perform better when they are outplanted in their native environment relative to foreign populations. In Panel B both regions show signs of maladaptation to their native environments relative to the foreign regions, while C and D show instances where populations from one region consistently outperform the other region. Panel E shows predictions that align with the climate variability hypothesis, where populations from the Strait of Georgia are less vulnerable to future seawater temperatures because they have evolved greater thermal breadths. Panel F shows predictions that align with the trade-off hypothesis, where populations from the Strait of Georgia are more vulnerable to ocean warming because of energetic trade-offs associated with maintaining higher thermal tolerance</a:t>
+            </a:r>
+            <a:r>
+              <a:rPr lang="en-CA" sz="1200" b="0" i="0" kern="1200">
+                <a:solidFill>
+                  <a:schemeClr val="tx1"/>
+                </a:solidFill>
+                <a:effectLst/>
+                <a:latin typeface="+mn-lt"/>
+                <a:ea typeface="+mn-ea"/>
+                <a:cs typeface="+mn-cs"/>
+              </a:rPr>
+              <a:t>. </a:t>
+            </a:r>
+            <a:endParaRPr lang="en-US" dirty="0"/>
+          </a:p>
+        </p:txBody>
+      </p:sp>
+      <p:sp>
+        <p:nvSpPr>
+          <p:cNvPr id="4" name="Slide Number Placeholder 3"/>
+          <p:cNvSpPr>
+            <a:spLocks noGrp="1"/>
+          </p:cNvSpPr>
+          <p:nvPr>
+            <p:ph type="sldNum" sz="quarter" idx="5"/>
+          </p:nvPr>
+        </p:nvSpPr>
+        <p:spPr/>
+        <p:txBody>
+          <a:bodyPr/>
+          <a:lstStyle/>
+          <a:p>
+            <a:fld id="{394C3521-F9E2-554D-A9AC-88A34B7F84F8}" type="slidenum">
+              <a:rPr lang="en-US" smtClean="0"/>
+              <a:t>4</a:t>
+            </a:fld>
+            <a:endParaRPr lang="en-US"/>
+          </a:p>
+        </p:txBody>
+      </p:sp>
+    </p:spTree>
+    <p:extLst>
+      <p:ext uri="{BB962C8B-B14F-4D97-AF65-F5344CB8AC3E}">
+        <p14:creationId xmlns:p14="http://schemas.microsoft.com/office/powerpoint/2010/main" val="2287512007"/>
+      </p:ext>
+    </p:extLst>
+  </p:cSld>
+  <p:clrMapOvr>
+    <a:masterClrMapping/>
+  </p:clrMapOvr>
+</p:notes>
+</file>
+
 <file path=ppt/slideLayouts/slideLayout1.xml><?xml version="1.0" encoding="utf-8"?>
 <p:sldLayout xmlns:a="http://schemas.openxmlformats.org/drawingml/2006/main" xmlns:r="http://schemas.openxmlformats.org/officeDocument/2006/relationships" xmlns:p="http://schemas.openxmlformats.org/presentationml/2006/main" type="title" preserve="1">
   <p:cSld name="Title Slide">
@@ -945,7 +1082,7 @@
           <a:p>
             <a:fld id="{C446594C-9C26-1C41-BADB-56C901B363CC}" type="datetimeFigureOut">
               <a:rPr lang="en-US" smtClean="0"/>
-              <a:t>4/4/22</a:t>
+              <a:t>6/25/22</a:t>
             </a:fld>
             <a:endParaRPr lang="en-US"/>
           </a:p>
@@ -1143,7 +1280,7 @@
           <a:p>
             <a:fld id="{C446594C-9C26-1C41-BADB-56C901B363CC}" type="datetimeFigureOut">
               <a:rPr lang="en-US" smtClean="0"/>
-              <a:t>4/4/22</a:t>
+              <a:t>6/25/22</a:t>
             </a:fld>
             <a:endParaRPr lang="en-US"/>
           </a:p>
@@ -1351,7 +1488,7 @@
           <a:p>
             <a:fld id="{C446594C-9C26-1C41-BADB-56C901B363CC}" type="datetimeFigureOut">
               <a:rPr lang="en-US" smtClean="0"/>
-              <a:t>4/4/22</a:t>
+              <a:t>6/25/22</a:t>
             </a:fld>
             <a:endParaRPr lang="en-US"/>
           </a:p>
@@ -1549,7 +1686,7 @@
           <a:p>
             <a:fld id="{C446594C-9C26-1C41-BADB-56C901B363CC}" type="datetimeFigureOut">
               <a:rPr lang="en-US" smtClean="0"/>
-              <a:t>4/4/22</a:t>
+              <a:t>6/25/22</a:t>
             </a:fld>
             <a:endParaRPr lang="en-US"/>
           </a:p>
@@ -1824,7 +1961,7 @@
           <a:p>
             <a:fld id="{C446594C-9C26-1C41-BADB-56C901B363CC}" type="datetimeFigureOut">
               <a:rPr lang="en-US" smtClean="0"/>
-              <a:t>4/4/22</a:t>
+              <a:t>6/25/22</a:t>
             </a:fld>
             <a:endParaRPr lang="en-US"/>
           </a:p>
@@ -2089,7 +2226,7 @@
           <a:p>
             <a:fld id="{C446594C-9C26-1C41-BADB-56C901B363CC}" type="datetimeFigureOut">
               <a:rPr lang="en-US" smtClean="0"/>
-              <a:t>4/4/22</a:t>
+              <a:t>6/25/22</a:t>
             </a:fld>
             <a:endParaRPr lang="en-US"/>
           </a:p>
@@ -2501,7 +2638,7 @@
           <a:p>
             <a:fld id="{C446594C-9C26-1C41-BADB-56C901B363CC}" type="datetimeFigureOut">
               <a:rPr lang="en-US" smtClean="0"/>
-              <a:t>4/4/22</a:t>
+              <a:t>6/25/22</a:t>
             </a:fld>
             <a:endParaRPr lang="en-US"/>
           </a:p>
@@ -2642,7 +2779,7 @@
           <a:p>
             <a:fld id="{C446594C-9C26-1C41-BADB-56C901B363CC}" type="datetimeFigureOut">
               <a:rPr lang="en-US" smtClean="0"/>
-              <a:t>4/4/22</a:t>
+              <a:t>6/25/22</a:t>
             </a:fld>
             <a:endParaRPr lang="en-US"/>
           </a:p>
@@ -2755,7 +2892,7 @@
           <a:p>
             <a:fld id="{C446594C-9C26-1C41-BADB-56C901B363CC}" type="datetimeFigureOut">
               <a:rPr lang="en-US" smtClean="0"/>
-              <a:t>4/4/22</a:t>
+              <a:t>6/25/22</a:t>
             </a:fld>
             <a:endParaRPr lang="en-US"/>
           </a:p>
@@ -3066,7 +3203,7 @@
           <a:p>
             <a:fld id="{C446594C-9C26-1C41-BADB-56C901B363CC}" type="datetimeFigureOut">
               <a:rPr lang="en-US" smtClean="0"/>
-              <a:t>4/4/22</a:t>
+              <a:t>6/25/22</a:t>
             </a:fld>
             <a:endParaRPr lang="en-US"/>
           </a:p>
@@ -3354,7 +3491,7 @@
           <a:p>
             <a:fld id="{C446594C-9C26-1C41-BADB-56C901B363CC}" type="datetimeFigureOut">
               <a:rPr lang="en-US" smtClean="0"/>
-              <a:t>4/4/22</a:t>
+              <a:t>6/25/22</a:t>
             </a:fld>
             <a:endParaRPr lang="en-US"/>
           </a:p>
@@ -3595,7 +3732,7 @@
           <a:p>
             <a:fld id="{C446594C-9C26-1C41-BADB-56C901B363CC}" type="datetimeFigureOut">
               <a:rPr lang="en-US" smtClean="0"/>
-              <a:t>4/4/22</a:t>
+              <a:t>6/25/22</a:t>
             </a:fld>
             <a:endParaRPr lang="en-US"/>
           </a:p>
@@ -21424,6 +21561,3120 @@
 </p:sld>
 </file>
 
+<file path=ppt/slides/slide4.xml><?xml version="1.0" encoding="utf-8"?>
+<p:sld xmlns:a="http://schemas.openxmlformats.org/drawingml/2006/main" xmlns:r="http://schemas.openxmlformats.org/officeDocument/2006/relationships" xmlns:p="http://schemas.openxmlformats.org/presentationml/2006/main">
+  <p:cSld>
+    <p:spTree>
+      <p:nvGrpSpPr>
+        <p:cNvPr id="1" name=""/>
+        <p:cNvGrpSpPr/>
+        <p:nvPr/>
+      </p:nvGrpSpPr>
+      <p:grpSpPr>
+        <a:xfrm>
+          <a:off x="0" y="0"/>
+          <a:ext cx="0" cy="0"/>
+          <a:chOff x="0" y="0"/>
+          <a:chExt cx="0" cy="0"/>
+        </a:xfrm>
+      </p:grpSpPr>
+      <p:sp>
+        <p:nvSpPr>
+          <p:cNvPr id="8" name="TextBox 7">
+            <a:extLst>
+              <a:ext uri="{FF2B5EF4-FFF2-40B4-BE49-F238E27FC236}">
+                <a16:creationId xmlns:a16="http://schemas.microsoft.com/office/drawing/2014/main" id="{51037936-6747-C245-870F-E784D15A6BCE}"/>
+              </a:ext>
+            </a:extLst>
+          </p:cNvPr>
+          <p:cNvSpPr txBox="1"/>
+          <p:nvPr/>
+        </p:nvSpPr>
+        <p:spPr>
+          <a:xfrm>
+            <a:off x="1148622" y="3434748"/>
+            <a:ext cx="402674" cy="276999"/>
+          </a:xfrm>
+          <a:prstGeom prst="rect">
+            <a:avLst/>
+          </a:prstGeom>
+          <a:noFill/>
+        </p:spPr>
+        <p:txBody>
+          <a:bodyPr wrap="none" rtlCol="0">
+            <a:spAutoFit/>
+          </a:bodyPr>
+          <a:lstStyle/>
+          <a:p>
+            <a:r>
+              <a:rPr lang="en-US" sz="1200" dirty="0">
+                <a:latin typeface="Avenir Book" panose="02000503020000020003" pitchFamily="2" charset="0"/>
+                <a:cs typeface="Arial" panose="020B0604020202020204" pitchFamily="34" charset="0"/>
+              </a:rPr>
+              <a:t>CC</a:t>
+            </a:r>
+          </a:p>
+        </p:txBody>
+      </p:sp>
+      <p:sp>
+        <p:nvSpPr>
+          <p:cNvPr id="9" name="TextBox 8">
+            <a:extLst>
+              <a:ext uri="{FF2B5EF4-FFF2-40B4-BE49-F238E27FC236}">
+                <a16:creationId xmlns:a16="http://schemas.microsoft.com/office/drawing/2014/main" id="{906312AC-EC9E-6040-893D-8CD009ECC627}"/>
+              </a:ext>
+            </a:extLst>
+          </p:cNvPr>
+          <p:cNvSpPr txBox="1"/>
+          <p:nvPr/>
+        </p:nvSpPr>
+        <p:spPr>
+          <a:xfrm>
+            <a:off x="1862588" y="3434748"/>
+            <a:ext cx="481222" cy="276999"/>
+          </a:xfrm>
+          <a:prstGeom prst="rect">
+            <a:avLst/>
+          </a:prstGeom>
+          <a:noFill/>
+        </p:spPr>
+        <p:txBody>
+          <a:bodyPr wrap="none" rtlCol="0">
+            <a:spAutoFit/>
+          </a:bodyPr>
+          <a:lstStyle/>
+          <a:p>
+            <a:r>
+              <a:rPr lang="en-US" sz="1200" dirty="0" err="1">
+                <a:latin typeface="Avenir Book" panose="02000503020000020003" pitchFamily="2" charset="0"/>
+                <a:cs typeface="Arial" panose="020B0604020202020204" pitchFamily="34" charset="0"/>
+              </a:rPr>
+              <a:t>SoG</a:t>
+            </a:r>
+            <a:endParaRPr lang="en-US" sz="1200" dirty="0">
+              <a:latin typeface="Avenir Book" panose="02000503020000020003" pitchFamily="2" charset="0"/>
+              <a:cs typeface="Arial" panose="020B0604020202020204" pitchFamily="34" charset="0"/>
+            </a:endParaRPr>
+          </a:p>
+        </p:txBody>
+      </p:sp>
+      <p:sp>
+        <p:nvSpPr>
+          <p:cNvPr id="10" name="TextBox 9">
+            <a:extLst>
+              <a:ext uri="{FF2B5EF4-FFF2-40B4-BE49-F238E27FC236}">
+                <a16:creationId xmlns:a16="http://schemas.microsoft.com/office/drawing/2014/main" id="{E16CCD7E-97C8-5A41-8213-8408962C636D}"/>
+              </a:ext>
+            </a:extLst>
+          </p:cNvPr>
+          <p:cNvSpPr txBox="1"/>
+          <p:nvPr/>
+        </p:nvSpPr>
+        <p:spPr>
+          <a:xfrm>
+            <a:off x="1762490" y="425335"/>
+            <a:ext cx="1854995" cy="307777"/>
+          </a:xfrm>
+          <a:prstGeom prst="rect">
+            <a:avLst/>
+          </a:prstGeom>
+          <a:noFill/>
+        </p:spPr>
+        <p:txBody>
+          <a:bodyPr wrap="none" rtlCol="0">
+            <a:spAutoFit/>
+          </a:bodyPr>
+          <a:lstStyle/>
+          <a:p>
+            <a:r>
+              <a:rPr lang="en-US" sz="1400" dirty="0">
+                <a:latin typeface="Avenir Book" panose="02000503020000020003" pitchFamily="2" charset="0"/>
+                <a:cs typeface="Arial" panose="020B0604020202020204" pitchFamily="34" charset="0"/>
+              </a:rPr>
+              <a:t>Reciprocal transplant</a:t>
+            </a:r>
+          </a:p>
+        </p:txBody>
+      </p:sp>
+      <p:grpSp>
+        <p:nvGrpSpPr>
+          <p:cNvPr id="59" name="Group 58">
+            <a:extLst>
+              <a:ext uri="{FF2B5EF4-FFF2-40B4-BE49-F238E27FC236}">
+                <a16:creationId xmlns:a16="http://schemas.microsoft.com/office/drawing/2014/main" id="{71F8B6C5-11FB-7259-B170-7B821DE7F49B}"/>
+              </a:ext>
+            </a:extLst>
+          </p:cNvPr>
+          <p:cNvGrpSpPr/>
+          <p:nvPr/>
+        </p:nvGrpSpPr>
+        <p:grpSpPr>
+          <a:xfrm>
+            <a:off x="1072820" y="861531"/>
+            <a:ext cx="1339303" cy="1234342"/>
+            <a:chOff x="2850487" y="853358"/>
+            <a:chExt cx="1339303" cy="1234342"/>
+          </a:xfrm>
+        </p:grpSpPr>
+        <p:sp>
+          <p:nvSpPr>
+            <p:cNvPr id="4" name="Half Frame 3">
+              <a:extLst>
+                <a:ext uri="{FF2B5EF4-FFF2-40B4-BE49-F238E27FC236}">
+                  <a16:creationId xmlns:a16="http://schemas.microsoft.com/office/drawing/2014/main" id="{CC8D75D1-2C8D-CB46-88AF-B48B7CC28C80}"/>
+                </a:ext>
+              </a:extLst>
+            </p:cNvPr>
+            <p:cNvSpPr/>
+            <p:nvPr/>
+          </p:nvSpPr>
+          <p:spPr>
+            <a:xfrm rot="16200000">
+              <a:off x="2902968" y="800877"/>
+              <a:ext cx="1234342" cy="1339303"/>
+            </a:xfrm>
+            <a:prstGeom prst="halfFrame">
+              <a:avLst>
+                <a:gd name="adj1" fmla="val 239"/>
+                <a:gd name="adj2" fmla="val 239"/>
+              </a:avLst>
+            </a:prstGeom>
+            <a:solidFill>
+              <a:schemeClr val="tx1"/>
+            </a:solidFill>
+            <a:ln>
+              <a:solidFill>
+                <a:schemeClr val="tx1"/>
+              </a:solidFill>
+            </a:ln>
+          </p:spPr>
+          <p:style>
+            <a:lnRef idx="2">
+              <a:schemeClr val="accent1">
+                <a:shade val="50000"/>
+              </a:schemeClr>
+            </a:lnRef>
+            <a:fillRef idx="1">
+              <a:schemeClr val="accent1"/>
+            </a:fillRef>
+            <a:effectRef idx="0">
+              <a:schemeClr val="accent1"/>
+            </a:effectRef>
+            <a:fontRef idx="minor">
+              <a:schemeClr val="lt1"/>
+            </a:fontRef>
+          </p:style>
+          <p:txBody>
+            <a:bodyPr rtlCol="0" anchor="ctr"/>
+            <a:lstStyle/>
+            <a:p>
+              <a:pPr algn="ctr"/>
+              <a:endParaRPr lang="en-US" sz="1200">
+                <a:solidFill>
+                  <a:schemeClr val="tx1"/>
+                </a:solidFill>
+                <a:latin typeface="Avenir Book" panose="02000503020000020003" pitchFamily="2" charset="0"/>
+                <a:cs typeface="Arial" panose="020B0604020202020204" pitchFamily="34" charset="0"/>
+              </a:endParaRPr>
+            </a:p>
+          </p:txBody>
+        </p:sp>
+        <p:sp>
+          <p:nvSpPr>
+            <p:cNvPr id="19" name="Rectangle 18">
+              <a:extLst>
+                <a:ext uri="{FF2B5EF4-FFF2-40B4-BE49-F238E27FC236}">
+                  <a16:creationId xmlns:a16="http://schemas.microsoft.com/office/drawing/2014/main" id="{4C3F669F-90AC-3F4B-8972-8087B01782F4}"/>
+                </a:ext>
+              </a:extLst>
+            </p:cNvPr>
+            <p:cNvSpPr/>
+            <p:nvPr/>
+          </p:nvSpPr>
+          <p:spPr>
+            <a:xfrm>
+              <a:off x="3100477" y="1101476"/>
+              <a:ext cx="85555" cy="90366"/>
+            </a:xfrm>
+            <a:prstGeom prst="rect">
+              <a:avLst/>
+            </a:prstGeom>
+            <a:solidFill>
+              <a:schemeClr val="tx1"/>
+            </a:solidFill>
+            <a:ln w="38100">
+              <a:solidFill>
+                <a:schemeClr val="tx1"/>
+              </a:solidFill>
+            </a:ln>
+          </p:spPr>
+          <p:style>
+            <a:lnRef idx="2">
+              <a:schemeClr val="accent1">
+                <a:shade val="50000"/>
+              </a:schemeClr>
+            </a:lnRef>
+            <a:fillRef idx="1">
+              <a:schemeClr val="accent1"/>
+            </a:fillRef>
+            <a:effectRef idx="0">
+              <a:schemeClr val="accent1"/>
+            </a:effectRef>
+            <a:fontRef idx="minor">
+              <a:schemeClr val="lt1"/>
+            </a:fontRef>
+          </p:style>
+          <p:txBody>
+            <a:bodyPr rtlCol="0" anchor="ctr"/>
+            <a:lstStyle/>
+            <a:p>
+              <a:pPr algn="ctr"/>
+              <a:endParaRPr lang="en-US" sz="1200">
+                <a:latin typeface="Avenir Book" panose="02000503020000020003" pitchFamily="2" charset="0"/>
+                <a:cs typeface="Arial" panose="020B0604020202020204" pitchFamily="34" charset="0"/>
+              </a:endParaRPr>
+            </a:p>
+          </p:txBody>
+        </p:sp>
+        <p:sp>
+          <p:nvSpPr>
+            <p:cNvPr id="20" name="Oval 19">
+              <a:extLst>
+                <a:ext uri="{FF2B5EF4-FFF2-40B4-BE49-F238E27FC236}">
+                  <a16:creationId xmlns:a16="http://schemas.microsoft.com/office/drawing/2014/main" id="{89DB6FCF-590F-9048-A743-D266A281809F}"/>
+                </a:ext>
+              </a:extLst>
+            </p:cNvPr>
+            <p:cNvSpPr/>
+            <p:nvPr/>
+          </p:nvSpPr>
+          <p:spPr>
+            <a:xfrm>
+              <a:off x="3915003" y="1612082"/>
+              <a:ext cx="94110" cy="99403"/>
+            </a:xfrm>
+            <a:prstGeom prst="ellipse">
+              <a:avLst/>
+            </a:prstGeom>
+            <a:solidFill>
+              <a:schemeClr val="bg2">
+                <a:lumMod val="50000"/>
+              </a:schemeClr>
+            </a:solidFill>
+            <a:ln w="38100">
+              <a:solidFill>
+                <a:schemeClr val="bg2">
+                  <a:lumMod val="50000"/>
+                </a:schemeClr>
+              </a:solidFill>
+            </a:ln>
+          </p:spPr>
+          <p:style>
+            <a:lnRef idx="2">
+              <a:schemeClr val="accent1">
+                <a:shade val="50000"/>
+              </a:schemeClr>
+            </a:lnRef>
+            <a:fillRef idx="1">
+              <a:schemeClr val="accent1"/>
+            </a:fillRef>
+            <a:effectRef idx="0">
+              <a:schemeClr val="accent1"/>
+            </a:effectRef>
+            <a:fontRef idx="minor">
+              <a:schemeClr val="lt1"/>
+            </a:fontRef>
+          </p:style>
+          <p:txBody>
+            <a:bodyPr rtlCol="0" anchor="ctr"/>
+            <a:lstStyle/>
+            <a:p>
+              <a:pPr algn="ctr"/>
+              <a:endParaRPr lang="en-US" sz="1200">
+                <a:latin typeface="Avenir Book" panose="02000503020000020003" pitchFamily="2" charset="0"/>
+                <a:cs typeface="Arial" panose="020B0604020202020204" pitchFamily="34" charset="0"/>
+              </a:endParaRPr>
+            </a:p>
+          </p:txBody>
+        </p:sp>
+        <p:sp>
+          <p:nvSpPr>
+            <p:cNvPr id="21" name="Rectangle 20">
+              <a:extLst>
+                <a:ext uri="{FF2B5EF4-FFF2-40B4-BE49-F238E27FC236}">
+                  <a16:creationId xmlns:a16="http://schemas.microsoft.com/office/drawing/2014/main" id="{67ADE6F8-4ED8-7540-991E-133A4B4084E3}"/>
+                </a:ext>
+              </a:extLst>
+            </p:cNvPr>
+            <p:cNvSpPr/>
+            <p:nvPr/>
+          </p:nvSpPr>
+          <p:spPr>
+            <a:xfrm>
+              <a:off x="3919281" y="1794188"/>
+              <a:ext cx="85555" cy="90366"/>
+            </a:xfrm>
+            <a:prstGeom prst="rect">
+              <a:avLst/>
+            </a:prstGeom>
+            <a:solidFill>
+              <a:schemeClr val="tx1"/>
+            </a:solidFill>
+            <a:ln w="38100">
+              <a:solidFill>
+                <a:schemeClr val="tx1"/>
+              </a:solidFill>
+            </a:ln>
+          </p:spPr>
+          <p:style>
+            <a:lnRef idx="2">
+              <a:schemeClr val="accent1">
+                <a:shade val="50000"/>
+              </a:schemeClr>
+            </a:lnRef>
+            <a:fillRef idx="1">
+              <a:schemeClr val="accent1"/>
+            </a:fillRef>
+            <a:effectRef idx="0">
+              <a:schemeClr val="accent1"/>
+            </a:effectRef>
+            <a:fontRef idx="minor">
+              <a:schemeClr val="lt1"/>
+            </a:fontRef>
+          </p:style>
+          <p:txBody>
+            <a:bodyPr rtlCol="0" anchor="ctr"/>
+            <a:lstStyle/>
+            <a:p>
+              <a:pPr algn="ctr"/>
+              <a:endParaRPr lang="en-US" sz="1200">
+                <a:latin typeface="Avenir Book" panose="02000503020000020003" pitchFamily="2" charset="0"/>
+                <a:cs typeface="Arial" panose="020B0604020202020204" pitchFamily="34" charset="0"/>
+              </a:endParaRPr>
+            </a:p>
+          </p:txBody>
+        </p:sp>
+        <p:sp>
+          <p:nvSpPr>
+            <p:cNvPr id="22" name="Oval 21">
+              <a:extLst>
+                <a:ext uri="{FF2B5EF4-FFF2-40B4-BE49-F238E27FC236}">
+                  <a16:creationId xmlns:a16="http://schemas.microsoft.com/office/drawing/2014/main" id="{DB2E7F9F-5628-F242-9967-0015545B435E}"/>
+                </a:ext>
+              </a:extLst>
+            </p:cNvPr>
+            <p:cNvSpPr/>
+            <p:nvPr/>
+          </p:nvSpPr>
+          <p:spPr>
+            <a:xfrm>
+              <a:off x="3096199" y="1327372"/>
+              <a:ext cx="94110" cy="99403"/>
+            </a:xfrm>
+            <a:prstGeom prst="ellipse">
+              <a:avLst/>
+            </a:prstGeom>
+            <a:solidFill>
+              <a:schemeClr val="bg2">
+                <a:lumMod val="50000"/>
+              </a:schemeClr>
+            </a:solidFill>
+            <a:ln w="38100">
+              <a:solidFill>
+                <a:schemeClr val="bg2">
+                  <a:lumMod val="50000"/>
+                </a:schemeClr>
+              </a:solidFill>
+            </a:ln>
+          </p:spPr>
+          <p:style>
+            <a:lnRef idx="2">
+              <a:schemeClr val="accent1">
+                <a:shade val="50000"/>
+              </a:schemeClr>
+            </a:lnRef>
+            <a:fillRef idx="1">
+              <a:schemeClr val="accent1"/>
+            </a:fillRef>
+            <a:effectRef idx="0">
+              <a:schemeClr val="accent1"/>
+            </a:effectRef>
+            <a:fontRef idx="minor">
+              <a:schemeClr val="lt1"/>
+            </a:fontRef>
+          </p:style>
+          <p:txBody>
+            <a:bodyPr rtlCol="0" anchor="ctr"/>
+            <a:lstStyle/>
+            <a:p>
+              <a:pPr algn="ctr"/>
+              <a:endParaRPr lang="en-US" sz="1200">
+                <a:latin typeface="Avenir Book" panose="02000503020000020003" pitchFamily="2" charset="0"/>
+                <a:cs typeface="Arial" panose="020B0604020202020204" pitchFamily="34" charset="0"/>
+              </a:endParaRPr>
+            </a:p>
+          </p:txBody>
+        </p:sp>
+        <p:cxnSp>
+          <p:nvCxnSpPr>
+            <p:cNvPr id="12" name="Straight Connector 11">
+              <a:extLst>
+                <a:ext uri="{FF2B5EF4-FFF2-40B4-BE49-F238E27FC236}">
+                  <a16:creationId xmlns:a16="http://schemas.microsoft.com/office/drawing/2014/main" id="{606C5D84-AEFB-4C49-9291-EF6B609E0C31}"/>
+                </a:ext>
+              </a:extLst>
+            </p:cNvPr>
+            <p:cNvCxnSpPr>
+              <a:cxnSpLocks/>
+              <a:stCxn id="19" idx="3"/>
+              <a:endCxn id="21" idx="1"/>
+            </p:cNvCxnSpPr>
+            <p:nvPr/>
+          </p:nvCxnSpPr>
+          <p:spPr>
+            <a:xfrm>
+              <a:off x="3186032" y="1146659"/>
+              <a:ext cx="733249" cy="692712"/>
+            </a:xfrm>
+            <a:prstGeom prst="line">
+              <a:avLst/>
+            </a:prstGeom>
+            <a:ln w="28575">
+              <a:solidFill>
+                <a:schemeClr val="tx1"/>
+              </a:solidFill>
+            </a:ln>
+          </p:spPr>
+          <p:style>
+            <a:lnRef idx="1">
+              <a:schemeClr val="accent1"/>
+            </a:lnRef>
+            <a:fillRef idx="0">
+              <a:schemeClr val="accent1"/>
+            </a:fillRef>
+            <a:effectRef idx="0">
+              <a:schemeClr val="accent1"/>
+            </a:effectRef>
+            <a:fontRef idx="minor">
+              <a:schemeClr val="tx1"/>
+            </a:fontRef>
+          </p:style>
+        </p:cxnSp>
+        <p:cxnSp>
+          <p:nvCxnSpPr>
+            <p:cNvPr id="108" name="Straight Connector 107">
+              <a:extLst>
+                <a:ext uri="{FF2B5EF4-FFF2-40B4-BE49-F238E27FC236}">
+                  <a16:creationId xmlns:a16="http://schemas.microsoft.com/office/drawing/2014/main" id="{FEBA5BC3-9BBD-6047-8EA1-952B67A889C3}"/>
+                </a:ext>
+              </a:extLst>
+            </p:cNvPr>
+            <p:cNvCxnSpPr>
+              <a:cxnSpLocks/>
+              <a:stCxn id="22" idx="6"/>
+              <a:endCxn id="20" idx="2"/>
+            </p:cNvCxnSpPr>
+            <p:nvPr/>
+          </p:nvCxnSpPr>
+          <p:spPr>
+            <a:xfrm>
+              <a:off x="3190309" y="1377074"/>
+              <a:ext cx="724694" cy="284710"/>
+            </a:xfrm>
+            <a:prstGeom prst="line">
+              <a:avLst/>
+            </a:prstGeom>
+            <a:ln w="28575">
+              <a:solidFill>
+                <a:schemeClr val="bg2">
+                  <a:lumMod val="50000"/>
+                </a:schemeClr>
+              </a:solidFill>
+            </a:ln>
+          </p:spPr>
+          <p:style>
+            <a:lnRef idx="1">
+              <a:schemeClr val="accent1"/>
+            </a:lnRef>
+            <a:fillRef idx="0">
+              <a:schemeClr val="accent1"/>
+            </a:fillRef>
+            <a:effectRef idx="0">
+              <a:schemeClr val="accent1"/>
+            </a:effectRef>
+            <a:fontRef idx="minor">
+              <a:schemeClr val="tx1"/>
+            </a:fontRef>
+          </p:style>
+        </p:cxnSp>
+      </p:grpSp>
+      <p:sp>
+        <p:nvSpPr>
+          <p:cNvPr id="124" name="TextBox 123">
+            <a:extLst>
+              <a:ext uri="{FF2B5EF4-FFF2-40B4-BE49-F238E27FC236}">
+                <a16:creationId xmlns:a16="http://schemas.microsoft.com/office/drawing/2014/main" id="{FDC9D97E-8639-C956-DC1E-F945095B86BB}"/>
+              </a:ext>
+            </a:extLst>
+          </p:cNvPr>
+          <p:cNvSpPr txBox="1"/>
+          <p:nvPr/>
+        </p:nvSpPr>
+        <p:spPr>
+          <a:xfrm rot="16200000">
+            <a:off x="47882" y="1977099"/>
+            <a:ext cx="1061060" cy="276999"/>
+          </a:xfrm>
+          <a:prstGeom prst="rect">
+            <a:avLst/>
+          </a:prstGeom>
+          <a:noFill/>
+        </p:spPr>
+        <p:txBody>
+          <a:bodyPr wrap="none" rtlCol="0">
+            <a:spAutoFit/>
+          </a:bodyPr>
+          <a:lstStyle/>
+          <a:p>
+            <a:r>
+              <a:rPr lang="en-US" sz="1200" dirty="0">
+                <a:latin typeface="Avenir Book" panose="02000503020000020003" pitchFamily="2" charset="0"/>
+                <a:cs typeface="Arial" panose="020B0604020202020204" pitchFamily="34" charset="0"/>
+              </a:rPr>
+              <a:t>performance</a:t>
+            </a:r>
+          </a:p>
+        </p:txBody>
+      </p:sp>
+      <p:cxnSp>
+        <p:nvCxnSpPr>
+          <p:cNvPr id="129" name="Straight Arrow Connector 128">
+            <a:extLst>
+              <a:ext uri="{FF2B5EF4-FFF2-40B4-BE49-F238E27FC236}">
+                <a16:creationId xmlns:a16="http://schemas.microsoft.com/office/drawing/2014/main" id="{998764C6-B7B3-D56C-B1E1-A44735463DEF}"/>
+              </a:ext>
+            </a:extLst>
+          </p:cNvPr>
+          <p:cNvCxnSpPr>
+            <a:cxnSpLocks/>
+          </p:cNvCxnSpPr>
+          <p:nvPr/>
+        </p:nvCxnSpPr>
+        <p:spPr>
+          <a:xfrm flipV="1">
+            <a:off x="801094" y="1714184"/>
+            <a:ext cx="0" cy="940186"/>
+          </a:xfrm>
+          <a:prstGeom prst="straightConnector1">
+            <a:avLst/>
+          </a:prstGeom>
+          <a:ln w="38100">
+            <a:solidFill>
+              <a:schemeClr val="tx1"/>
+            </a:solidFill>
+            <a:tailEnd type="triangle"/>
+          </a:ln>
+        </p:spPr>
+        <p:style>
+          <a:lnRef idx="1">
+            <a:schemeClr val="accent1"/>
+          </a:lnRef>
+          <a:fillRef idx="0">
+            <a:schemeClr val="accent1"/>
+          </a:fillRef>
+          <a:effectRef idx="0">
+            <a:schemeClr val="accent1"/>
+          </a:effectRef>
+          <a:fontRef idx="minor">
+            <a:schemeClr val="tx1"/>
+          </a:fontRef>
+        </p:style>
+      </p:cxnSp>
+      <p:grpSp>
+        <p:nvGrpSpPr>
+          <p:cNvPr id="58" name="Group 57">
+            <a:extLst>
+              <a:ext uri="{FF2B5EF4-FFF2-40B4-BE49-F238E27FC236}">
+                <a16:creationId xmlns:a16="http://schemas.microsoft.com/office/drawing/2014/main" id="{82F6E930-2FB7-D380-4DFE-75034E4AD5C2}"/>
+              </a:ext>
+            </a:extLst>
+          </p:cNvPr>
+          <p:cNvGrpSpPr/>
+          <p:nvPr/>
+        </p:nvGrpSpPr>
+        <p:grpSpPr>
+          <a:xfrm>
+            <a:off x="1073450" y="2185893"/>
+            <a:ext cx="1338381" cy="1234342"/>
+            <a:chOff x="1040562" y="860015"/>
+            <a:chExt cx="1338381" cy="1234342"/>
+          </a:xfrm>
+        </p:grpSpPr>
+        <p:sp>
+          <p:nvSpPr>
+            <p:cNvPr id="123" name="Half Frame 122">
+              <a:extLst>
+                <a:ext uri="{FF2B5EF4-FFF2-40B4-BE49-F238E27FC236}">
+                  <a16:creationId xmlns:a16="http://schemas.microsoft.com/office/drawing/2014/main" id="{7231EA97-8FB1-8323-FFA8-760F98072CC5}"/>
+                </a:ext>
+              </a:extLst>
+            </p:cNvPr>
+            <p:cNvSpPr/>
+            <p:nvPr/>
+          </p:nvSpPr>
+          <p:spPr>
+            <a:xfrm rot="16200000">
+              <a:off x="1092582" y="807995"/>
+              <a:ext cx="1234342" cy="1338381"/>
+            </a:xfrm>
+            <a:prstGeom prst="halfFrame">
+              <a:avLst>
+                <a:gd name="adj1" fmla="val 239"/>
+                <a:gd name="adj2" fmla="val 239"/>
+              </a:avLst>
+            </a:prstGeom>
+            <a:solidFill>
+              <a:schemeClr val="tx1"/>
+            </a:solidFill>
+            <a:ln>
+              <a:solidFill>
+                <a:schemeClr val="tx1"/>
+              </a:solidFill>
+            </a:ln>
+          </p:spPr>
+          <p:style>
+            <a:lnRef idx="2">
+              <a:schemeClr val="accent1">
+                <a:shade val="50000"/>
+              </a:schemeClr>
+            </a:lnRef>
+            <a:fillRef idx="1">
+              <a:schemeClr val="accent1"/>
+            </a:fillRef>
+            <a:effectRef idx="0">
+              <a:schemeClr val="accent1"/>
+            </a:effectRef>
+            <a:fontRef idx="minor">
+              <a:schemeClr val="lt1"/>
+            </a:fontRef>
+          </p:style>
+          <p:txBody>
+            <a:bodyPr rtlCol="0" anchor="ctr"/>
+            <a:lstStyle/>
+            <a:p>
+              <a:pPr algn="ctr"/>
+              <a:endParaRPr lang="en-US" sz="1200">
+                <a:solidFill>
+                  <a:schemeClr val="tx1"/>
+                </a:solidFill>
+                <a:latin typeface="Avenir Book" panose="02000503020000020003" pitchFamily="2" charset="0"/>
+                <a:cs typeface="Arial" panose="020B0604020202020204" pitchFamily="34" charset="0"/>
+              </a:endParaRPr>
+            </a:p>
+          </p:txBody>
+        </p:sp>
+        <p:sp>
+          <p:nvSpPr>
+            <p:cNvPr id="125" name="Rectangle 124">
+              <a:extLst>
+                <a:ext uri="{FF2B5EF4-FFF2-40B4-BE49-F238E27FC236}">
+                  <a16:creationId xmlns:a16="http://schemas.microsoft.com/office/drawing/2014/main" id="{7F9EF448-37E1-5A0D-2429-7252E2F59993}"/>
+                </a:ext>
+              </a:extLst>
+            </p:cNvPr>
+            <p:cNvSpPr/>
+            <p:nvPr/>
+          </p:nvSpPr>
+          <p:spPr>
+            <a:xfrm>
+              <a:off x="1302876" y="1327372"/>
+              <a:ext cx="85555" cy="90366"/>
+            </a:xfrm>
+            <a:prstGeom prst="rect">
+              <a:avLst/>
+            </a:prstGeom>
+            <a:solidFill>
+              <a:schemeClr val="tx1"/>
+            </a:solidFill>
+            <a:ln w="38100">
+              <a:solidFill>
+                <a:schemeClr val="tx1"/>
+              </a:solidFill>
+            </a:ln>
+          </p:spPr>
+          <p:style>
+            <a:lnRef idx="2">
+              <a:schemeClr val="accent1">
+                <a:shade val="50000"/>
+              </a:schemeClr>
+            </a:lnRef>
+            <a:fillRef idx="1">
+              <a:schemeClr val="accent1"/>
+            </a:fillRef>
+            <a:effectRef idx="0">
+              <a:schemeClr val="accent1"/>
+            </a:effectRef>
+            <a:fontRef idx="minor">
+              <a:schemeClr val="lt1"/>
+            </a:fontRef>
+          </p:style>
+          <p:txBody>
+            <a:bodyPr rtlCol="0" anchor="ctr"/>
+            <a:lstStyle/>
+            <a:p>
+              <a:pPr algn="ctr"/>
+              <a:endParaRPr lang="en-US" sz="1200">
+                <a:latin typeface="Avenir Book" panose="02000503020000020003" pitchFamily="2" charset="0"/>
+                <a:cs typeface="Arial" panose="020B0604020202020204" pitchFamily="34" charset="0"/>
+              </a:endParaRPr>
+            </a:p>
+          </p:txBody>
+        </p:sp>
+        <p:sp>
+          <p:nvSpPr>
+            <p:cNvPr id="126" name="Oval 125">
+              <a:extLst>
+                <a:ext uri="{FF2B5EF4-FFF2-40B4-BE49-F238E27FC236}">
+                  <a16:creationId xmlns:a16="http://schemas.microsoft.com/office/drawing/2014/main" id="{803A16A2-EB01-4F7F-06AD-2B423025CA1E}"/>
+                </a:ext>
+              </a:extLst>
+            </p:cNvPr>
+            <p:cNvSpPr/>
+            <p:nvPr/>
+          </p:nvSpPr>
+          <p:spPr>
+            <a:xfrm>
+              <a:off x="2113051" y="1794088"/>
+              <a:ext cx="94110" cy="99403"/>
+            </a:xfrm>
+            <a:prstGeom prst="ellipse">
+              <a:avLst/>
+            </a:prstGeom>
+            <a:solidFill>
+              <a:schemeClr val="bg2">
+                <a:lumMod val="50000"/>
+              </a:schemeClr>
+            </a:solidFill>
+            <a:ln w="38100">
+              <a:solidFill>
+                <a:schemeClr val="bg2">
+                  <a:lumMod val="50000"/>
+                </a:schemeClr>
+              </a:solidFill>
+            </a:ln>
+          </p:spPr>
+          <p:style>
+            <a:lnRef idx="2">
+              <a:schemeClr val="accent1">
+                <a:shade val="50000"/>
+              </a:schemeClr>
+            </a:lnRef>
+            <a:fillRef idx="1">
+              <a:schemeClr val="accent1"/>
+            </a:fillRef>
+            <a:effectRef idx="0">
+              <a:schemeClr val="accent1"/>
+            </a:effectRef>
+            <a:fontRef idx="minor">
+              <a:schemeClr val="lt1"/>
+            </a:fontRef>
+          </p:style>
+          <p:txBody>
+            <a:bodyPr rtlCol="0" anchor="ctr"/>
+            <a:lstStyle/>
+            <a:p>
+              <a:pPr algn="ctr"/>
+              <a:endParaRPr lang="en-US" sz="1200">
+                <a:latin typeface="Avenir Book" panose="02000503020000020003" pitchFamily="2" charset="0"/>
+                <a:cs typeface="Arial" panose="020B0604020202020204" pitchFamily="34" charset="0"/>
+              </a:endParaRPr>
+            </a:p>
+          </p:txBody>
+        </p:sp>
+        <p:sp>
+          <p:nvSpPr>
+            <p:cNvPr id="127" name="Rectangle 126">
+              <a:extLst>
+                <a:ext uri="{FF2B5EF4-FFF2-40B4-BE49-F238E27FC236}">
+                  <a16:creationId xmlns:a16="http://schemas.microsoft.com/office/drawing/2014/main" id="{C9D27DE5-3F86-0B0B-F478-363303A0525E}"/>
+                </a:ext>
+              </a:extLst>
+            </p:cNvPr>
+            <p:cNvSpPr/>
+            <p:nvPr/>
+          </p:nvSpPr>
+          <p:spPr>
+            <a:xfrm>
+              <a:off x="2117329" y="1634312"/>
+              <a:ext cx="85555" cy="90366"/>
+            </a:xfrm>
+            <a:prstGeom prst="rect">
+              <a:avLst/>
+            </a:prstGeom>
+            <a:solidFill>
+              <a:schemeClr val="tx1"/>
+            </a:solidFill>
+            <a:ln w="38100">
+              <a:solidFill>
+                <a:schemeClr val="tx1"/>
+              </a:solidFill>
+            </a:ln>
+          </p:spPr>
+          <p:style>
+            <a:lnRef idx="2">
+              <a:schemeClr val="accent1">
+                <a:shade val="50000"/>
+              </a:schemeClr>
+            </a:lnRef>
+            <a:fillRef idx="1">
+              <a:schemeClr val="accent1"/>
+            </a:fillRef>
+            <a:effectRef idx="0">
+              <a:schemeClr val="accent1"/>
+            </a:effectRef>
+            <a:fontRef idx="minor">
+              <a:schemeClr val="lt1"/>
+            </a:fontRef>
+          </p:style>
+          <p:txBody>
+            <a:bodyPr rtlCol="0" anchor="ctr"/>
+            <a:lstStyle/>
+            <a:p>
+              <a:pPr algn="ctr"/>
+              <a:endParaRPr lang="en-US" sz="1200">
+                <a:latin typeface="Avenir Book" panose="02000503020000020003" pitchFamily="2" charset="0"/>
+                <a:cs typeface="Arial" panose="020B0604020202020204" pitchFamily="34" charset="0"/>
+              </a:endParaRPr>
+            </a:p>
+          </p:txBody>
+        </p:sp>
+        <p:sp>
+          <p:nvSpPr>
+            <p:cNvPr id="128" name="Oval 127">
+              <a:extLst>
+                <a:ext uri="{FF2B5EF4-FFF2-40B4-BE49-F238E27FC236}">
+                  <a16:creationId xmlns:a16="http://schemas.microsoft.com/office/drawing/2014/main" id="{319DF428-E662-4B98-3AA2-51B80FFE0ACD}"/>
+                </a:ext>
+              </a:extLst>
+            </p:cNvPr>
+            <p:cNvSpPr/>
+            <p:nvPr/>
+          </p:nvSpPr>
+          <p:spPr>
+            <a:xfrm>
+              <a:off x="1298598" y="1096958"/>
+              <a:ext cx="94110" cy="99403"/>
+            </a:xfrm>
+            <a:prstGeom prst="ellipse">
+              <a:avLst/>
+            </a:prstGeom>
+            <a:solidFill>
+              <a:schemeClr val="bg2">
+                <a:lumMod val="50000"/>
+              </a:schemeClr>
+            </a:solidFill>
+            <a:ln w="38100">
+              <a:solidFill>
+                <a:schemeClr val="bg2">
+                  <a:lumMod val="50000"/>
+                </a:schemeClr>
+              </a:solidFill>
+            </a:ln>
+          </p:spPr>
+          <p:style>
+            <a:lnRef idx="2">
+              <a:schemeClr val="accent1">
+                <a:shade val="50000"/>
+              </a:schemeClr>
+            </a:lnRef>
+            <a:fillRef idx="1">
+              <a:schemeClr val="accent1"/>
+            </a:fillRef>
+            <a:effectRef idx="0">
+              <a:schemeClr val="accent1"/>
+            </a:effectRef>
+            <a:fontRef idx="minor">
+              <a:schemeClr val="lt1"/>
+            </a:fontRef>
+          </p:style>
+          <p:txBody>
+            <a:bodyPr rtlCol="0" anchor="ctr"/>
+            <a:lstStyle/>
+            <a:p>
+              <a:pPr algn="ctr"/>
+              <a:endParaRPr lang="en-US" sz="1200">
+                <a:latin typeface="Avenir Book" panose="02000503020000020003" pitchFamily="2" charset="0"/>
+                <a:cs typeface="Arial" panose="020B0604020202020204" pitchFamily="34" charset="0"/>
+              </a:endParaRPr>
+            </a:p>
+          </p:txBody>
+        </p:sp>
+        <p:cxnSp>
+          <p:nvCxnSpPr>
+            <p:cNvPr id="130" name="Straight Connector 129">
+              <a:extLst>
+                <a:ext uri="{FF2B5EF4-FFF2-40B4-BE49-F238E27FC236}">
+                  <a16:creationId xmlns:a16="http://schemas.microsoft.com/office/drawing/2014/main" id="{A6A16C93-8910-AAED-5C85-722B1A9294CE}"/>
+                </a:ext>
+              </a:extLst>
+            </p:cNvPr>
+            <p:cNvCxnSpPr>
+              <a:cxnSpLocks/>
+              <a:stCxn id="125" idx="3"/>
+              <a:endCxn id="127" idx="1"/>
+            </p:cNvCxnSpPr>
+            <p:nvPr/>
+          </p:nvCxnSpPr>
+          <p:spPr>
+            <a:xfrm>
+              <a:off x="1388431" y="1372555"/>
+              <a:ext cx="728898" cy="306940"/>
+            </a:xfrm>
+            <a:prstGeom prst="line">
+              <a:avLst/>
+            </a:prstGeom>
+            <a:ln w="28575">
+              <a:solidFill>
+                <a:schemeClr val="tx1"/>
+              </a:solidFill>
+            </a:ln>
+          </p:spPr>
+          <p:style>
+            <a:lnRef idx="1">
+              <a:schemeClr val="accent1"/>
+            </a:lnRef>
+            <a:fillRef idx="0">
+              <a:schemeClr val="accent1"/>
+            </a:fillRef>
+            <a:effectRef idx="0">
+              <a:schemeClr val="accent1"/>
+            </a:effectRef>
+            <a:fontRef idx="minor">
+              <a:schemeClr val="tx1"/>
+            </a:fontRef>
+          </p:style>
+        </p:cxnSp>
+        <p:cxnSp>
+          <p:nvCxnSpPr>
+            <p:cNvPr id="131" name="Straight Connector 130">
+              <a:extLst>
+                <a:ext uri="{FF2B5EF4-FFF2-40B4-BE49-F238E27FC236}">
+                  <a16:creationId xmlns:a16="http://schemas.microsoft.com/office/drawing/2014/main" id="{F27FC391-85A3-ED17-6DC9-E8EC8CC6BE06}"/>
+                </a:ext>
+              </a:extLst>
+            </p:cNvPr>
+            <p:cNvCxnSpPr>
+              <a:cxnSpLocks/>
+              <a:stCxn id="128" idx="6"/>
+              <a:endCxn id="126" idx="2"/>
+            </p:cNvCxnSpPr>
+            <p:nvPr/>
+          </p:nvCxnSpPr>
+          <p:spPr>
+            <a:xfrm>
+              <a:off x="1392708" y="1146660"/>
+              <a:ext cx="720343" cy="697130"/>
+            </a:xfrm>
+            <a:prstGeom prst="line">
+              <a:avLst/>
+            </a:prstGeom>
+            <a:ln w="28575">
+              <a:solidFill>
+                <a:schemeClr val="bg2">
+                  <a:lumMod val="50000"/>
+                </a:schemeClr>
+              </a:solidFill>
+            </a:ln>
+          </p:spPr>
+          <p:style>
+            <a:lnRef idx="1">
+              <a:schemeClr val="accent1"/>
+            </a:lnRef>
+            <a:fillRef idx="0">
+              <a:schemeClr val="accent1"/>
+            </a:fillRef>
+            <a:effectRef idx="0">
+              <a:schemeClr val="accent1"/>
+            </a:effectRef>
+            <a:fontRef idx="minor">
+              <a:schemeClr val="tx1"/>
+            </a:fontRef>
+          </p:style>
+        </p:cxnSp>
+      </p:grpSp>
+      <p:grpSp>
+        <p:nvGrpSpPr>
+          <p:cNvPr id="61" name="Group 60">
+            <a:extLst>
+              <a:ext uri="{FF2B5EF4-FFF2-40B4-BE49-F238E27FC236}">
+                <a16:creationId xmlns:a16="http://schemas.microsoft.com/office/drawing/2014/main" id="{08F21E90-D4D4-C3E9-541E-2B31996263D0}"/>
+              </a:ext>
+            </a:extLst>
+          </p:cNvPr>
+          <p:cNvGrpSpPr/>
+          <p:nvPr/>
+        </p:nvGrpSpPr>
+        <p:grpSpPr>
+          <a:xfrm>
+            <a:off x="2834160" y="2188055"/>
+            <a:ext cx="1339303" cy="1234342"/>
+            <a:chOff x="2847592" y="2185991"/>
+            <a:chExt cx="1339303" cy="1234342"/>
+          </a:xfrm>
+        </p:grpSpPr>
+        <p:sp>
+          <p:nvSpPr>
+            <p:cNvPr id="63" name="Half Frame 62">
+              <a:extLst>
+                <a:ext uri="{FF2B5EF4-FFF2-40B4-BE49-F238E27FC236}">
+                  <a16:creationId xmlns:a16="http://schemas.microsoft.com/office/drawing/2014/main" id="{2A5A914F-5D63-364E-8AB6-911CA9F59D2A}"/>
+                </a:ext>
+              </a:extLst>
+            </p:cNvPr>
+            <p:cNvSpPr/>
+            <p:nvPr/>
+          </p:nvSpPr>
+          <p:spPr>
+            <a:xfrm rot="16200000">
+              <a:off x="2900073" y="2133510"/>
+              <a:ext cx="1234342" cy="1339303"/>
+            </a:xfrm>
+            <a:prstGeom prst="halfFrame">
+              <a:avLst>
+                <a:gd name="adj1" fmla="val 239"/>
+                <a:gd name="adj2" fmla="val 239"/>
+              </a:avLst>
+            </a:prstGeom>
+            <a:solidFill>
+              <a:schemeClr val="tx1"/>
+            </a:solidFill>
+            <a:ln>
+              <a:solidFill>
+                <a:schemeClr val="tx1"/>
+              </a:solidFill>
+            </a:ln>
+          </p:spPr>
+          <p:style>
+            <a:lnRef idx="2">
+              <a:schemeClr val="accent1">
+                <a:shade val="50000"/>
+              </a:schemeClr>
+            </a:lnRef>
+            <a:fillRef idx="1">
+              <a:schemeClr val="accent1"/>
+            </a:fillRef>
+            <a:effectRef idx="0">
+              <a:schemeClr val="accent1"/>
+            </a:effectRef>
+            <a:fontRef idx="minor">
+              <a:schemeClr val="lt1"/>
+            </a:fontRef>
+          </p:style>
+          <p:txBody>
+            <a:bodyPr rtlCol="0" anchor="ctr"/>
+            <a:lstStyle/>
+            <a:p>
+              <a:pPr algn="ctr"/>
+              <a:endParaRPr lang="en-US" sz="1200">
+                <a:solidFill>
+                  <a:schemeClr val="tx1"/>
+                </a:solidFill>
+                <a:latin typeface="Avenir Book" panose="02000503020000020003" pitchFamily="2" charset="0"/>
+                <a:cs typeface="Arial" panose="020B0604020202020204" pitchFamily="34" charset="0"/>
+              </a:endParaRPr>
+            </a:p>
+          </p:txBody>
+        </p:sp>
+        <p:sp>
+          <p:nvSpPr>
+            <p:cNvPr id="65" name="Rectangle 64">
+              <a:extLst>
+                <a:ext uri="{FF2B5EF4-FFF2-40B4-BE49-F238E27FC236}">
+                  <a16:creationId xmlns:a16="http://schemas.microsoft.com/office/drawing/2014/main" id="{5EAFE27D-5E79-E74B-BC87-E21C7090F615}"/>
+                </a:ext>
+              </a:extLst>
+            </p:cNvPr>
+            <p:cNvSpPr/>
+            <p:nvPr/>
+          </p:nvSpPr>
+          <p:spPr>
+            <a:xfrm>
+              <a:off x="3100477" y="2492847"/>
+              <a:ext cx="85555" cy="90366"/>
+            </a:xfrm>
+            <a:prstGeom prst="rect">
+              <a:avLst/>
+            </a:prstGeom>
+            <a:solidFill>
+              <a:schemeClr val="tx1"/>
+            </a:solidFill>
+            <a:ln w="38100">
+              <a:solidFill>
+                <a:schemeClr val="tx1"/>
+              </a:solidFill>
+            </a:ln>
+          </p:spPr>
+          <p:style>
+            <a:lnRef idx="2">
+              <a:schemeClr val="accent1">
+                <a:shade val="50000"/>
+              </a:schemeClr>
+            </a:lnRef>
+            <a:fillRef idx="1">
+              <a:schemeClr val="accent1"/>
+            </a:fillRef>
+            <a:effectRef idx="0">
+              <a:schemeClr val="accent1"/>
+            </a:effectRef>
+            <a:fontRef idx="minor">
+              <a:schemeClr val="lt1"/>
+            </a:fontRef>
+          </p:style>
+          <p:txBody>
+            <a:bodyPr rtlCol="0" anchor="ctr"/>
+            <a:lstStyle/>
+            <a:p>
+              <a:pPr algn="ctr"/>
+              <a:endParaRPr lang="en-US" sz="1200">
+                <a:latin typeface="Avenir Book" panose="02000503020000020003" pitchFamily="2" charset="0"/>
+                <a:cs typeface="Arial" panose="020B0604020202020204" pitchFamily="34" charset="0"/>
+              </a:endParaRPr>
+            </a:p>
+          </p:txBody>
+        </p:sp>
+        <p:sp>
+          <p:nvSpPr>
+            <p:cNvPr id="66" name="Oval 65">
+              <a:extLst>
+                <a:ext uri="{FF2B5EF4-FFF2-40B4-BE49-F238E27FC236}">
+                  <a16:creationId xmlns:a16="http://schemas.microsoft.com/office/drawing/2014/main" id="{D991FDBD-1FF6-B247-B27A-A9B2585A1378}"/>
+                </a:ext>
+              </a:extLst>
+            </p:cNvPr>
+            <p:cNvSpPr/>
+            <p:nvPr/>
+          </p:nvSpPr>
+          <p:spPr>
+            <a:xfrm>
+              <a:off x="3915003" y="3071689"/>
+              <a:ext cx="94111" cy="99403"/>
+            </a:xfrm>
+            <a:prstGeom prst="ellipse">
+              <a:avLst/>
+            </a:prstGeom>
+            <a:solidFill>
+              <a:schemeClr val="bg2">
+                <a:lumMod val="50000"/>
+              </a:schemeClr>
+            </a:solidFill>
+            <a:ln w="38100">
+              <a:solidFill>
+                <a:schemeClr val="bg2">
+                  <a:lumMod val="50000"/>
+                </a:schemeClr>
+              </a:solidFill>
+            </a:ln>
+          </p:spPr>
+          <p:style>
+            <a:lnRef idx="2">
+              <a:schemeClr val="accent1">
+                <a:shade val="50000"/>
+              </a:schemeClr>
+            </a:lnRef>
+            <a:fillRef idx="1">
+              <a:schemeClr val="accent1"/>
+            </a:fillRef>
+            <a:effectRef idx="0">
+              <a:schemeClr val="accent1"/>
+            </a:effectRef>
+            <a:fontRef idx="minor">
+              <a:schemeClr val="lt1"/>
+            </a:fontRef>
+          </p:style>
+          <p:txBody>
+            <a:bodyPr rtlCol="0" anchor="ctr"/>
+            <a:lstStyle/>
+            <a:p>
+              <a:pPr algn="ctr"/>
+              <a:endParaRPr lang="en-US" sz="1200">
+                <a:latin typeface="Avenir Book" panose="02000503020000020003" pitchFamily="2" charset="0"/>
+                <a:cs typeface="Arial" panose="020B0604020202020204" pitchFamily="34" charset="0"/>
+              </a:endParaRPr>
+            </a:p>
+          </p:txBody>
+        </p:sp>
+        <p:sp>
+          <p:nvSpPr>
+            <p:cNvPr id="67" name="Rectangle 66">
+              <a:extLst>
+                <a:ext uri="{FF2B5EF4-FFF2-40B4-BE49-F238E27FC236}">
+                  <a16:creationId xmlns:a16="http://schemas.microsoft.com/office/drawing/2014/main" id="{C06C924A-68CE-EB4E-BE07-9D69D6CD7225}"/>
+                </a:ext>
+              </a:extLst>
+            </p:cNvPr>
+            <p:cNvSpPr/>
+            <p:nvPr/>
+          </p:nvSpPr>
+          <p:spPr>
+            <a:xfrm>
+              <a:off x="3919281" y="2863772"/>
+              <a:ext cx="85555" cy="90366"/>
+            </a:xfrm>
+            <a:prstGeom prst="rect">
+              <a:avLst/>
+            </a:prstGeom>
+            <a:solidFill>
+              <a:schemeClr val="tx1"/>
+            </a:solidFill>
+            <a:ln w="38100">
+              <a:solidFill>
+                <a:schemeClr val="tx1"/>
+              </a:solidFill>
+            </a:ln>
+          </p:spPr>
+          <p:style>
+            <a:lnRef idx="2">
+              <a:schemeClr val="accent1">
+                <a:shade val="50000"/>
+              </a:schemeClr>
+            </a:lnRef>
+            <a:fillRef idx="1">
+              <a:schemeClr val="accent1"/>
+            </a:fillRef>
+            <a:effectRef idx="0">
+              <a:schemeClr val="accent1"/>
+            </a:effectRef>
+            <a:fontRef idx="minor">
+              <a:schemeClr val="lt1"/>
+            </a:fontRef>
+          </p:style>
+          <p:txBody>
+            <a:bodyPr rtlCol="0" anchor="ctr"/>
+            <a:lstStyle/>
+            <a:p>
+              <a:pPr algn="ctr"/>
+              <a:endParaRPr lang="en-US" sz="1200">
+                <a:latin typeface="Avenir Book" panose="02000503020000020003" pitchFamily="2" charset="0"/>
+                <a:cs typeface="Arial" panose="020B0604020202020204" pitchFamily="34" charset="0"/>
+              </a:endParaRPr>
+            </a:p>
+          </p:txBody>
+        </p:sp>
+        <p:sp>
+          <p:nvSpPr>
+            <p:cNvPr id="68" name="Oval 67">
+              <a:extLst>
+                <a:ext uri="{FF2B5EF4-FFF2-40B4-BE49-F238E27FC236}">
+                  <a16:creationId xmlns:a16="http://schemas.microsoft.com/office/drawing/2014/main" id="{BACD4F0B-3832-1E48-A5FD-E58511FF3F4E}"/>
+                </a:ext>
+              </a:extLst>
+            </p:cNvPr>
+            <p:cNvSpPr/>
+            <p:nvPr/>
+          </p:nvSpPr>
+          <p:spPr>
+            <a:xfrm>
+              <a:off x="3096199" y="2720203"/>
+              <a:ext cx="94111" cy="99403"/>
+            </a:xfrm>
+            <a:prstGeom prst="ellipse">
+              <a:avLst/>
+            </a:prstGeom>
+            <a:solidFill>
+              <a:schemeClr val="bg2">
+                <a:lumMod val="50000"/>
+              </a:schemeClr>
+            </a:solidFill>
+            <a:ln w="38100">
+              <a:solidFill>
+                <a:schemeClr val="bg2">
+                  <a:lumMod val="50000"/>
+                </a:schemeClr>
+              </a:solidFill>
+            </a:ln>
+          </p:spPr>
+          <p:style>
+            <a:lnRef idx="2">
+              <a:schemeClr val="accent1">
+                <a:shade val="50000"/>
+              </a:schemeClr>
+            </a:lnRef>
+            <a:fillRef idx="1">
+              <a:schemeClr val="accent1"/>
+            </a:fillRef>
+            <a:effectRef idx="0">
+              <a:schemeClr val="accent1"/>
+            </a:effectRef>
+            <a:fontRef idx="minor">
+              <a:schemeClr val="lt1"/>
+            </a:fontRef>
+          </p:style>
+          <p:txBody>
+            <a:bodyPr rtlCol="0" anchor="ctr"/>
+            <a:lstStyle/>
+            <a:p>
+              <a:pPr algn="ctr"/>
+              <a:endParaRPr lang="en-US" sz="1200">
+                <a:latin typeface="Avenir Book" panose="02000503020000020003" pitchFamily="2" charset="0"/>
+                <a:cs typeface="Arial" panose="020B0604020202020204" pitchFamily="34" charset="0"/>
+              </a:endParaRPr>
+            </a:p>
+          </p:txBody>
+        </p:sp>
+        <p:cxnSp>
+          <p:nvCxnSpPr>
+            <p:cNvPr id="50" name="Straight Connector 49">
+              <a:extLst>
+                <a:ext uri="{FF2B5EF4-FFF2-40B4-BE49-F238E27FC236}">
+                  <a16:creationId xmlns:a16="http://schemas.microsoft.com/office/drawing/2014/main" id="{25206F76-0164-0745-2A71-5662A7DCC290}"/>
+                </a:ext>
+              </a:extLst>
+            </p:cNvPr>
+            <p:cNvCxnSpPr>
+              <a:stCxn id="65" idx="3"/>
+              <a:endCxn id="67" idx="1"/>
+            </p:cNvCxnSpPr>
+            <p:nvPr/>
+          </p:nvCxnSpPr>
+          <p:spPr>
+            <a:xfrm>
+              <a:off x="3186032" y="2538030"/>
+              <a:ext cx="733249" cy="370925"/>
+            </a:xfrm>
+            <a:prstGeom prst="line">
+              <a:avLst/>
+            </a:prstGeom>
+            <a:ln w="28575">
+              <a:solidFill>
+                <a:schemeClr val="tx1"/>
+              </a:solidFill>
+            </a:ln>
+          </p:spPr>
+          <p:style>
+            <a:lnRef idx="1">
+              <a:schemeClr val="accent1"/>
+            </a:lnRef>
+            <a:fillRef idx="0">
+              <a:schemeClr val="accent1"/>
+            </a:fillRef>
+            <a:effectRef idx="0">
+              <a:schemeClr val="accent1"/>
+            </a:effectRef>
+            <a:fontRef idx="minor">
+              <a:schemeClr val="tx1"/>
+            </a:fontRef>
+          </p:style>
+        </p:cxnSp>
+        <p:cxnSp>
+          <p:nvCxnSpPr>
+            <p:cNvPr id="52" name="Straight Connector 51">
+              <a:extLst>
+                <a:ext uri="{FF2B5EF4-FFF2-40B4-BE49-F238E27FC236}">
+                  <a16:creationId xmlns:a16="http://schemas.microsoft.com/office/drawing/2014/main" id="{85C33EF3-04DB-70FF-AE24-D0E6462AC699}"/>
+                </a:ext>
+              </a:extLst>
+            </p:cNvPr>
+            <p:cNvCxnSpPr>
+              <a:stCxn id="68" idx="6"/>
+              <a:endCxn id="66" idx="2"/>
+            </p:cNvCxnSpPr>
+            <p:nvPr/>
+          </p:nvCxnSpPr>
+          <p:spPr>
+            <a:xfrm>
+              <a:off x="3190310" y="2769905"/>
+              <a:ext cx="724693" cy="351486"/>
+            </a:xfrm>
+            <a:prstGeom prst="line">
+              <a:avLst/>
+            </a:prstGeom>
+            <a:ln w="28575">
+              <a:solidFill>
+                <a:schemeClr val="tx1">
+                  <a:lumMod val="50000"/>
+                  <a:lumOff val="50000"/>
+                </a:schemeClr>
+              </a:solidFill>
+            </a:ln>
+          </p:spPr>
+          <p:style>
+            <a:lnRef idx="1">
+              <a:schemeClr val="accent1"/>
+            </a:lnRef>
+            <a:fillRef idx="0">
+              <a:schemeClr val="accent1"/>
+            </a:fillRef>
+            <a:effectRef idx="0">
+              <a:schemeClr val="accent1"/>
+            </a:effectRef>
+            <a:fontRef idx="minor">
+              <a:schemeClr val="tx1"/>
+            </a:fontRef>
+          </p:style>
+        </p:cxnSp>
+      </p:grpSp>
+      <p:grpSp>
+        <p:nvGrpSpPr>
+          <p:cNvPr id="60" name="Group 59">
+            <a:extLst>
+              <a:ext uri="{FF2B5EF4-FFF2-40B4-BE49-F238E27FC236}">
+                <a16:creationId xmlns:a16="http://schemas.microsoft.com/office/drawing/2014/main" id="{DB34B197-489C-837B-B25A-AC27A0BB4A68}"/>
+              </a:ext>
+            </a:extLst>
+          </p:cNvPr>
+          <p:cNvGrpSpPr/>
+          <p:nvPr/>
+        </p:nvGrpSpPr>
+        <p:grpSpPr>
+          <a:xfrm>
+            <a:off x="2834306" y="861531"/>
+            <a:ext cx="1339303" cy="1234342"/>
+            <a:chOff x="1040563" y="2185122"/>
+            <a:chExt cx="1339303" cy="1234342"/>
+          </a:xfrm>
+        </p:grpSpPr>
+        <p:sp>
+          <p:nvSpPr>
+            <p:cNvPr id="148" name="Half Frame 147">
+              <a:extLst>
+                <a:ext uri="{FF2B5EF4-FFF2-40B4-BE49-F238E27FC236}">
+                  <a16:creationId xmlns:a16="http://schemas.microsoft.com/office/drawing/2014/main" id="{76B4BE89-16C3-8CDD-5220-49B894A3D090}"/>
+                </a:ext>
+              </a:extLst>
+            </p:cNvPr>
+            <p:cNvSpPr/>
+            <p:nvPr/>
+          </p:nvSpPr>
+          <p:spPr>
+            <a:xfrm rot="16200000">
+              <a:off x="1093044" y="2132641"/>
+              <a:ext cx="1234342" cy="1339303"/>
+            </a:xfrm>
+            <a:prstGeom prst="halfFrame">
+              <a:avLst>
+                <a:gd name="adj1" fmla="val 239"/>
+                <a:gd name="adj2" fmla="val 239"/>
+              </a:avLst>
+            </a:prstGeom>
+            <a:solidFill>
+              <a:schemeClr val="tx1"/>
+            </a:solidFill>
+            <a:ln>
+              <a:solidFill>
+                <a:schemeClr val="tx1"/>
+              </a:solidFill>
+            </a:ln>
+          </p:spPr>
+          <p:style>
+            <a:lnRef idx="2">
+              <a:schemeClr val="accent1">
+                <a:shade val="50000"/>
+              </a:schemeClr>
+            </a:lnRef>
+            <a:fillRef idx="1">
+              <a:schemeClr val="accent1"/>
+            </a:fillRef>
+            <a:effectRef idx="0">
+              <a:schemeClr val="accent1"/>
+            </a:effectRef>
+            <a:fontRef idx="minor">
+              <a:schemeClr val="lt1"/>
+            </a:fontRef>
+          </p:style>
+          <p:txBody>
+            <a:bodyPr rtlCol="0" anchor="ctr"/>
+            <a:lstStyle/>
+            <a:p>
+              <a:pPr algn="ctr"/>
+              <a:endParaRPr lang="en-US" sz="1200">
+                <a:solidFill>
+                  <a:schemeClr val="tx1"/>
+                </a:solidFill>
+                <a:latin typeface="Avenir Book" panose="02000503020000020003" pitchFamily="2" charset="0"/>
+                <a:cs typeface="Arial" panose="020B0604020202020204" pitchFamily="34" charset="0"/>
+              </a:endParaRPr>
+            </a:p>
+          </p:txBody>
+        </p:sp>
+        <p:sp>
+          <p:nvSpPr>
+            <p:cNvPr id="152" name="Rectangle 151">
+              <a:extLst>
+                <a:ext uri="{FF2B5EF4-FFF2-40B4-BE49-F238E27FC236}">
+                  <a16:creationId xmlns:a16="http://schemas.microsoft.com/office/drawing/2014/main" id="{12E0FECA-E467-E9F5-117E-92DB8435BBB3}"/>
+                </a:ext>
+              </a:extLst>
+            </p:cNvPr>
+            <p:cNvSpPr/>
+            <p:nvPr/>
+          </p:nvSpPr>
+          <p:spPr>
+            <a:xfrm>
+              <a:off x="1302876" y="2724721"/>
+              <a:ext cx="85555" cy="90366"/>
+            </a:xfrm>
+            <a:prstGeom prst="rect">
+              <a:avLst/>
+            </a:prstGeom>
+            <a:solidFill>
+              <a:schemeClr val="tx1"/>
+            </a:solidFill>
+            <a:ln w="38100">
+              <a:solidFill>
+                <a:schemeClr val="tx1"/>
+              </a:solidFill>
+            </a:ln>
+          </p:spPr>
+          <p:style>
+            <a:lnRef idx="2">
+              <a:schemeClr val="accent1">
+                <a:shade val="50000"/>
+              </a:schemeClr>
+            </a:lnRef>
+            <a:fillRef idx="1">
+              <a:schemeClr val="accent1"/>
+            </a:fillRef>
+            <a:effectRef idx="0">
+              <a:schemeClr val="accent1"/>
+            </a:effectRef>
+            <a:fontRef idx="minor">
+              <a:schemeClr val="lt1"/>
+            </a:fontRef>
+          </p:style>
+          <p:txBody>
+            <a:bodyPr rtlCol="0" anchor="ctr"/>
+            <a:lstStyle/>
+            <a:p>
+              <a:pPr algn="ctr"/>
+              <a:endParaRPr lang="en-US" sz="1200">
+                <a:latin typeface="Avenir Book" panose="02000503020000020003" pitchFamily="2" charset="0"/>
+                <a:cs typeface="Arial" panose="020B0604020202020204" pitchFamily="34" charset="0"/>
+              </a:endParaRPr>
+            </a:p>
+          </p:txBody>
+        </p:sp>
+        <p:sp>
+          <p:nvSpPr>
+            <p:cNvPr id="153" name="Oval 152">
+              <a:extLst>
+                <a:ext uri="{FF2B5EF4-FFF2-40B4-BE49-F238E27FC236}">
+                  <a16:creationId xmlns:a16="http://schemas.microsoft.com/office/drawing/2014/main" id="{7799DEAA-CA07-9FBA-7E9E-BC8C86823AC6}"/>
+                </a:ext>
+              </a:extLst>
+            </p:cNvPr>
+            <p:cNvSpPr/>
+            <p:nvPr/>
+          </p:nvSpPr>
+          <p:spPr>
+            <a:xfrm>
+              <a:off x="2113051" y="2859254"/>
+              <a:ext cx="94111" cy="99403"/>
+            </a:xfrm>
+            <a:prstGeom prst="ellipse">
+              <a:avLst/>
+            </a:prstGeom>
+            <a:solidFill>
+              <a:schemeClr val="bg2">
+                <a:lumMod val="50000"/>
+              </a:schemeClr>
+            </a:solidFill>
+            <a:ln w="38100">
+              <a:solidFill>
+                <a:schemeClr val="bg2">
+                  <a:lumMod val="50000"/>
+                </a:schemeClr>
+              </a:solidFill>
+            </a:ln>
+          </p:spPr>
+          <p:style>
+            <a:lnRef idx="2">
+              <a:schemeClr val="accent1">
+                <a:shade val="50000"/>
+              </a:schemeClr>
+            </a:lnRef>
+            <a:fillRef idx="1">
+              <a:schemeClr val="accent1"/>
+            </a:fillRef>
+            <a:effectRef idx="0">
+              <a:schemeClr val="accent1"/>
+            </a:effectRef>
+            <a:fontRef idx="minor">
+              <a:schemeClr val="lt1"/>
+            </a:fontRef>
+          </p:style>
+          <p:txBody>
+            <a:bodyPr rtlCol="0" anchor="ctr"/>
+            <a:lstStyle/>
+            <a:p>
+              <a:pPr algn="ctr"/>
+              <a:endParaRPr lang="en-US" sz="1200">
+                <a:latin typeface="Avenir Book" panose="02000503020000020003" pitchFamily="2" charset="0"/>
+                <a:cs typeface="Arial" panose="020B0604020202020204" pitchFamily="34" charset="0"/>
+              </a:endParaRPr>
+            </a:p>
+          </p:txBody>
+        </p:sp>
+        <p:sp>
+          <p:nvSpPr>
+            <p:cNvPr id="154" name="Rectangle 153">
+              <a:extLst>
+                <a:ext uri="{FF2B5EF4-FFF2-40B4-BE49-F238E27FC236}">
+                  <a16:creationId xmlns:a16="http://schemas.microsoft.com/office/drawing/2014/main" id="{603BFC5D-8A0F-99A5-7AF0-0374B920390C}"/>
+                </a:ext>
+              </a:extLst>
+            </p:cNvPr>
+            <p:cNvSpPr/>
+            <p:nvPr/>
+          </p:nvSpPr>
+          <p:spPr>
+            <a:xfrm>
+              <a:off x="2117329" y="3076207"/>
+              <a:ext cx="85555" cy="90366"/>
+            </a:xfrm>
+            <a:prstGeom prst="rect">
+              <a:avLst/>
+            </a:prstGeom>
+            <a:solidFill>
+              <a:schemeClr val="tx1"/>
+            </a:solidFill>
+            <a:ln w="38100">
+              <a:solidFill>
+                <a:schemeClr val="tx1"/>
+              </a:solidFill>
+            </a:ln>
+          </p:spPr>
+          <p:style>
+            <a:lnRef idx="2">
+              <a:schemeClr val="accent1">
+                <a:shade val="50000"/>
+              </a:schemeClr>
+            </a:lnRef>
+            <a:fillRef idx="1">
+              <a:schemeClr val="accent1"/>
+            </a:fillRef>
+            <a:effectRef idx="0">
+              <a:schemeClr val="accent1"/>
+            </a:effectRef>
+            <a:fontRef idx="minor">
+              <a:schemeClr val="lt1"/>
+            </a:fontRef>
+          </p:style>
+          <p:txBody>
+            <a:bodyPr rtlCol="0" anchor="ctr"/>
+            <a:lstStyle/>
+            <a:p>
+              <a:pPr algn="ctr"/>
+              <a:endParaRPr lang="en-US" sz="1200">
+                <a:latin typeface="Avenir Book" panose="02000503020000020003" pitchFamily="2" charset="0"/>
+                <a:cs typeface="Arial" panose="020B0604020202020204" pitchFamily="34" charset="0"/>
+              </a:endParaRPr>
+            </a:p>
+          </p:txBody>
+        </p:sp>
+        <p:sp>
+          <p:nvSpPr>
+            <p:cNvPr id="155" name="Oval 154">
+              <a:extLst>
+                <a:ext uri="{FF2B5EF4-FFF2-40B4-BE49-F238E27FC236}">
+                  <a16:creationId xmlns:a16="http://schemas.microsoft.com/office/drawing/2014/main" id="{20770938-FF39-5A6A-D27D-71CD16397FFC}"/>
+                </a:ext>
+              </a:extLst>
+            </p:cNvPr>
+            <p:cNvSpPr/>
+            <p:nvPr/>
+          </p:nvSpPr>
+          <p:spPr>
+            <a:xfrm>
+              <a:off x="1298598" y="2488329"/>
+              <a:ext cx="94111" cy="99403"/>
+            </a:xfrm>
+            <a:prstGeom prst="ellipse">
+              <a:avLst/>
+            </a:prstGeom>
+            <a:solidFill>
+              <a:schemeClr val="bg2">
+                <a:lumMod val="50000"/>
+              </a:schemeClr>
+            </a:solidFill>
+            <a:ln w="38100">
+              <a:solidFill>
+                <a:schemeClr val="bg2">
+                  <a:lumMod val="50000"/>
+                </a:schemeClr>
+              </a:solidFill>
+            </a:ln>
+          </p:spPr>
+          <p:style>
+            <a:lnRef idx="2">
+              <a:schemeClr val="accent1">
+                <a:shade val="50000"/>
+              </a:schemeClr>
+            </a:lnRef>
+            <a:fillRef idx="1">
+              <a:schemeClr val="accent1"/>
+            </a:fillRef>
+            <a:effectRef idx="0">
+              <a:schemeClr val="accent1"/>
+            </a:effectRef>
+            <a:fontRef idx="minor">
+              <a:schemeClr val="lt1"/>
+            </a:fontRef>
+          </p:style>
+          <p:txBody>
+            <a:bodyPr rtlCol="0" anchor="ctr"/>
+            <a:lstStyle/>
+            <a:p>
+              <a:pPr algn="ctr"/>
+              <a:endParaRPr lang="en-US" sz="1200">
+                <a:latin typeface="Avenir Book" panose="02000503020000020003" pitchFamily="2" charset="0"/>
+                <a:cs typeface="Arial" panose="020B0604020202020204" pitchFamily="34" charset="0"/>
+              </a:endParaRPr>
+            </a:p>
+          </p:txBody>
+        </p:sp>
+        <p:cxnSp>
+          <p:nvCxnSpPr>
+            <p:cNvPr id="54" name="Straight Connector 53">
+              <a:extLst>
+                <a:ext uri="{FF2B5EF4-FFF2-40B4-BE49-F238E27FC236}">
+                  <a16:creationId xmlns:a16="http://schemas.microsoft.com/office/drawing/2014/main" id="{8FC93CBF-9B7C-9EFB-7136-EA47224AB587}"/>
+                </a:ext>
+              </a:extLst>
+            </p:cNvPr>
+            <p:cNvCxnSpPr>
+              <a:stCxn id="155" idx="6"/>
+              <a:endCxn id="153" idx="2"/>
+            </p:cNvCxnSpPr>
+            <p:nvPr/>
+          </p:nvCxnSpPr>
+          <p:spPr>
+            <a:xfrm>
+              <a:off x="1392709" y="2538031"/>
+              <a:ext cx="720342" cy="370925"/>
+            </a:xfrm>
+            <a:prstGeom prst="line">
+              <a:avLst/>
+            </a:prstGeom>
+            <a:ln w="28575">
+              <a:solidFill>
+                <a:schemeClr val="tx1">
+                  <a:lumMod val="50000"/>
+                  <a:lumOff val="50000"/>
+                </a:schemeClr>
+              </a:solidFill>
+            </a:ln>
+          </p:spPr>
+          <p:style>
+            <a:lnRef idx="1">
+              <a:schemeClr val="accent1"/>
+            </a:lnRef>
+            <a:fillRef idx="0">
+              <a:schemeClr val="accent1"/>
+            </a:fillRef>
+            <a:effectRef idx="0">
+              <a:schemeClr val="accent1"/>
+            </a:effectRef>
+            <a:fontRef idx="minor">
+              <a:schemeClr val="tx1"/>
+            </a:fontRef>
+          </p:style>
+        </p:cxnSp>
+        <p:cxnSp>
+          <p:nvCxnSpPr>
+            <p:cNvPr id="56" name="Straight Connector 55">
+              <a:extLst>
+                <a:ext uri="{FF2B5EF4-FFF2-40B4-BE49-F238E27FC236}">
+                  <a16:creationId xmlns:a16="http://schemas.microsoft.com/office/drawing/2014/main" id="{D3935A90-E06F-1647-4D7A-2D2CAE1B1CBA}"/>
+                </a:ext>
+              </a:extLst>
+            </p:cNvPr>
+            <p:cNvCxnSpPr>
+              <a:cxnSpLocks/>
+              <a:stCxn id="152" idx="3"/>
+              <a:endCxn id="154" idx="1"/>
+            </p:cNvCxnSpPr>
+            <p:nvPr/>
+          </p:nvCxnSpPr>
+          <p:spPr>
+            <a:xfrm>
+              <a:off x="1388431" y="2769904"/>
+              <a:ext cx="728898" cy="351486"/>
+            </a:xfrm>
+            <a:prstGeom prst="line">
+              <a:avLst/>
+            </a:prstGeom>
+            <a:ln w="28575">
+              <a:solidFill>
+                <a:schemeClr val="tx1"/>
+              </a:solidFill>
+            </a:ln>
+          </p:spPr>
+          <p:style>
+            <a:lnRef idx="1">
+              <a:schemeClr val="accent1"/>
+            </a:lnRef>
+            <a:fillRef idx="0">
+              <a:schemeClr val="accent1"/>
+            </a:fillRef>
+            <a:effectRef idx="0">
+              <a:schemeClr val="accent1"/>
+            </a:effectRef>
+            <a:fontRef idx="minor">
+              <a:schemeClr val="tx1"/>
+            </a:fontRef>
+          </p:style>
+        </p:cxnSp>
+      </p:grpSp>
+      <p:sp>
+        <p:nvSpPr>
+          <p:cNvPr id="161" name="TextBox 160">
+            <a:extLst>
+              <a:ext uri="{FF2B5EF4-FFF2-40B4-BE49-F238E27FC236}">
+                <a16:creationId xmlns:a16="http://schemas.microsoft.com/office/drawing/2014/main" id="{863CC507-CAB3-E0C3-7F31-231CD670B1FE}"/>
+              </a:ext>
+            </a:extLst>
+          </p:cNvPr>
+          <p:cNvSpPr txBox="1"/>
+          <p:nvPr/>
+        </p:nvSpPr>
+        <p:spPr>
+          <a:xfrm>
+            <a:off x="2946223" y="3434748"/>
+            <a:ext cx="402674" cy="276999"/>
+          </a:xfrm>
+          <a:prstGeom prst="rect">
+            <a:avLst/>
+          </a:prstGeom>
+          <a:noFill/>
+        </p:spPr>
+        <p:txBody>
+          <a:bodyPr wrap="none" rtlCol="0">
+            <a:spAutoFit/>
+          </a:bodyPr>
+          <a:lstStyle/>
+          <a:p>
+            <a:r>
+              <a:rPr lang="en-US" sz="1200" dirty="0">
+                <a:latin typeface="Avenir Book" panose="02000503020000020003" pitchFamily="2" charset="0"/>
+                <a:cs typeface="Arial" panose="020B0604020202020204" pitchFamily="34" charset="0"/>
+              </a:rPr>
+              <a:t>CC</a:t>
+            </a:r>
+          </a:p>
+        </p:txBody>
+      </p:sp>
+      <p:sp>
+        <p:nvSpPr>
+          <p:cNvPr id="163" name="TextBox 162">
+            <a:extLst>
+              <a:ext uri="{FF2B5EF4-FFF2-40B4-BE49-F238E27FC236}">
+                <a16:creationId xmlns:a16="http://schemas.microsoft.com/office/drawing/2014/main" id="{5AB02384-2B72-7245-301E-6984099BFD82}"/>
+              </a:ext>
+            </a:extLst>
+          </p:cNvPr>
+          <p:cNvSpPr txBox="1"/>
+          <p:nvPr/>
+        </p:nvSpPr>
+        <p:spPr>
+          <a:xfrm>
+            <a:off x="3617485" y="3434748"/>
+            <a:ext cx="481222" cy="276999"/>
+          </a:xfrm>
+          <a:prstGeom prst="rect">
+            <a:avLst/>
+          </a:prstGeom>
+          <a:noFill/>
+        </p:spPr>
+        <p:txBody>
+          <a:bodyPr wrap="none" rtlCol="0">
+            <a:spAutoFit/>
+          </a:bodyPr>
+          <a:lstStyle/>
+          <a:p>
+            <a:r>
+              <a:rPr lang="en-US" sz="1200" dirty="0" err="1">
+                <a:latin typeface="Avenir Book" panose="02000503020000020003" pitchFamily="2" charset="0"/>
+                <a:cs typeface="Arial" panose="020B0604020202020204" pitchFamily="34" charset="0"/>
+              </a:rPr>
+              <a:t>SoG</a:t>
+            </a:r>
+            <a:endParaRPr lang="en-US" sz="1200" dirty="0">
+              <a:latin typeface="Avenir Book" panose="02000503020000020003" pitchFamily="2" charset="0"/>
+              <a:cs typeface="Arial" panose="020B0604020202020204" pitchFamily="34" charset="0"/>
+            </a:endParaRPr>
+          </a:p>
+        </p:txBody>
+      </p:sp>
+      <p:sp>
+        <p:nvSpPr>
+          <p:cNvPr id="88" name="TextBox 87">
+            <a:extLst>
+              <a:ext uri="{FF2B5EF4-FFF2-40B4-BE49-F238E27FC236}">
+                <a16:creationId xmlns:a16="http://schemas.microsoft.com/office/drawing/2014/main" id="{758154CD-F86F-2D9D-3D05-7F4FE7E9B839}"/>
+              </a:ext>
+            </a:extLst>
+          </p:cNvPr>
+          <p:cNvSpPr txBox="1"/>
+          <p:nvPr/>
+        </p:nvSpPr>
+        <p:spPr>
+          <a:xfrm>
+            <a:off x="4639371" y="425335"/>
+            <a:ext cx="1048685" cy="307777"/>
+          </a:xfrm>
+          <a:prstGeom prst="rect">
+            <a:avLst/>
+          </a:prstGeom>
+          <a:noFill/>
+        </p:spPr>
+        <p:txBody>
+          <a:bodyPr wrap="none" rtlCol="0">
+            <a:spAutoFit/>
+          </a:bodyPr>
+          <a:lstStyle/>
+          <a:p>
+            <a:r>
+              <a:rPr lang="en-US" sz="1400" dirty="0">
+                <a:latin typeface="Avenir Book" panose="02000503020000020003" pitchFamily="2" charset="0"/>
+              </a:rPr>
+              <a:t>Mesocosm</a:t>
+            </a:r>
+          </a:p>
+        </p:txBody>
+      </p:sp>
+      <p:sp>
+        <p:nvSpPr>
+          <p:cNvPr id="190" name="TextBox 189">
+            <a:extLst>
+              <a:ext uri="{FF2B5EF4-FFF2-40B4-BE49-F238E27FC236}">
+                <a16:creationId xmlns:a16="http://schemas.microsoft.com/office/drawing/2014/main" id="{8EC7D440-A9FF-A821-8249-65EF2B22DB55}"/>
+              </a:ext>
+            </a:extLst>
+          </p:cNvPr>
+          <p:cNvSpPr txBox="1"/>
+          <p:nvPr/>
+        </p:nvSpPr>
+        <p:spPr>
+          <a:xfrm>
+            <a:off x="1060820" y="825555"/>
+            <a:ext cx="290464" cy="276999"/>
+          </a:xfrm>
+          <a:prstGeom prst="rect">
+            <a:avLst/>
+          </a:prstGeom>
+          <a:noFill/>
+        </p:spPr>
+        <p:txBody>
+          <a:bodyPr wrap="none" rtlCol="0">
+            <a:spAutoFit/>
+          </a:bodyPr>
+          <a:lstStyle/>
+          <a:p>
+            <a:r>
+              <a:rPr lang="en-US" sz="1200" dirty="0">
+                <a:latin typeface="Avenir Book" panose="02000503020000020003" pitchFamily="2" charset="0"/>
+              </a:rPr>
+              <a:t>A</a:t>
+            </a:r>
+          </a:p>
+        </p:txBody>
+      </p:sp>
+      <p:sp>
+        <p:nvSpPr>
+          <p:cNvPr id="191" name="TextBox 190">
+            <a:extLst>
+              <a:ext uri="{FF2B5EF4-FFF2-40B4-BE49-F238E27FC236}">
+                <a16:creationId xmlns:a16="http://schemas.microsoft.com/office/drawing/2014/main" id="{D053BF16-1A04-EE96-45A9-022AD1C668A7}"/>
+              </a:ext>
+            </a:extLst>
+          </p:cNvPr>
+          <p:cNvSpPr txBox="1"/>
+          <p:nvPr/>
+        </p:nvSpPr>
+        <p:spPr>
+          <a:xfrm>
+            <a:off x="1040240" y="2144312"/>
+            <a:ext cx="280846" cy="276999"/>
+          </a:xfrm>
+          <a:prstGeom prst="rect">
+            <a:avLst/>
+          </a:prstGeom>
+          <a:noFill/>
+        </p:spPr>
+        <p:txBody>
+          <a:bodyPr wrap="none" rtlCol="0">
+            <a:spAutoFit/>
+          </a:bodyPr>
+          <a:lstStyle/>
+          <a:p>
+            <a:r>
+              <a:rPr lang="en-US" sz="1200" dirty="0">
+                <a:latin typeface="Avenir Book" panose="02000503020000020003" pitchFamily="2" charset="0"/>
+              </a:rPr>
+              <a:t>B</a:t>
+            </a:r>
+          </a:p>
+        </p:txBody>
+      </p:sp>
+      <p:sp>
+        <p:nvSpPr>
+          <p:cNvPr id="193" name="TextBox 192">
+            <a:extLst>
+              <a:ext uri="{FF2B5EF4-FFF2-40B4-BE49-F238E27FC236}">
+                <a16:creationId xmlns:a16="http://schemas.microsoft.com/office/drawing/2014/main" id="{AD700CD9-6193-667D-D2FA-20EAC9E932E3}"/>
+              </a:ext>
+            </a:extLst>
+          </p:cNvPr>
+          <p:cNvSpPr txBox="1"/>
+          <p:nvPr/>
+        </p:nvSpPr>
+        <p:spPr>
+          <a:xfrm>
+            <a:off x="2843493" y="827780"/>
+            <a:ext cx="293670" cy="276999"/>
+          </a:xfrm>
+          <a:prstGeom prst="rect">
+            <a:avLst/>
+          </a:prstGeom>
+          <a:noFill/>
+        </p:spPr>
+        <p:txBody>
+          <a:bodyPr wrap="none" rtlCol="0">
+            <a:spAutoFit/>
+          </a:bodyPr>
+          <a:lstStyle/>
+          <a:p>
+            <a:r>
+              <a:rPr lang="en-US" sz="1200" dirty="0">
+                <a:latin typeface="Avenir Book" panose="02000503020000020003" pitchFamily="2" charset="0"/>
+              </a:rPr>
+              <a:t>C</a:t>
+            </a:r>
+          </a:p>
+        </p:txBody>
+      </p:sp>
+      <p:sp>
+        <p:nvSpPr>
+          <p:cNvPr id="194" name="TextBox 193">
+            <a:extLst>
+              <a:ext uri="{FF2B5EF4-FFF2-40B4-BE49-F238E27FC236}">
+                <a16:creationId xmlns:a16="http://schemas.microsoft.com/office/drawing/2014/main" id="{9271C30F-C653-8203-8837-5F1137583116}"/>
+              </a:ext>
+            </a:extLst>
+          </p:cNvPr>
+          <p:cNvSpPr txBox="1"/>
+          <p:nvPr/>
+        </p:nvSpPr>
+        <p:spPr>
+          <a:xfrm>
+            <a:off x="2858698" y="2153429"/>
+            <a:ext cx="298480" cy="276999"/>
+          </a:xfrm>
+          <a:prstGeom prst="rect">
+            <a:avLst/>
+          </a:prstGeom>
+          <a:noFill/>
+        </p:spPr>
+        <p:txBody>
+          <a:bodyPr wrap="none" rtlCol="0">
+            <a:spAutoFit/>
+          </a:bodyPr>
+          <a:lstStyle/>
+          <a:p>
+            <a:r>
+              <a:rPr lang="en-US" sz="1200" dirty="0">
+                <a:latin typeface="Avenir Book" panose="02000503020000020003" pitchFamily="2" charset="0"/>
+              </a:rPr>
+              <a:t>D</a:t>
+            </a:r>
+          </a:p>
+        </p:txBody>
+      </p:sp>
+      <p:grpSp>
+        <p:nvGrpSpPr>
+          <p:cNvPr id="198" name="Group 197">
+            <a:extLst>
+              <a:ext uri="{FF2B5EF4-FFF2-40B4-BE49-F238E27FC236}">
+                <a16:creationId xmlns:a16="http://schemas.microsoft.com/office/drawing/2014/main" id="{42B6E140-2B65-A697-E654-C81CF83B789E}"/>
+              </a:ext>
+            </a:extLst>
+          </p:cNvPr>
+          <p:cNvGrpSpPr/>
+          <p:nvPr/>
+        </p:nvGrpSpPr>
+        <p:grpSpPr>
+          <a:xfrm>
+            <a:off x="4595793" y="825555"/>
+            <a:ext cx="1339303" cy="1270318"/>
+            <a:chOff x="4595793" y="812259"/>
+            <a:chExt cx="1339303" cy="1270318"/>
+          </a:xfrm>
+        </p:grpSpPr>
+        <p:sp>
+          <p:nvSpPr>
+            <p:cNvPr id="164" name="Half Frame 163">
+              <a:extLst>
+                <a:ext uri="{FF2B5EF4-FFF2-40B4-BE49-F238E27FC236}">
+                  <a16:creationId xmlns:a16="http://schemas.microsoft.com/office/drawing/2014/main" id="{3E6A8D2B-A76F-02E8-16EA-966033F7CE96}"/>
+                </a:ext>
+              </a:extLst>
+            </p:cNvPr>
+            <p:cNvSpPr/>
+            <p:nvPr/>
+          </p:nvSpPr>
+          <p:spPr>
+            <a:xfrm rot="16200000">
+              <a:off x="4648274" y="795754"/>
+              <a:ext cx="1234342" cy="1339303"/>
+            </a:xfrm>
+            <a:prstGeom prst="halfFrame">
+              <a:avLst>
+                <a:gd name="adj1" fmla="val 239"/>
+                <a:gd name="adj2" fmla="val 239"/>
+              </a:avLst>
+            </a:prstGeom>
+            <a:solidFill>
+              <a:schemeClr val="tx1"/>
+            </a:solidFill>
+            <a:ln>
+              <a:solidFill>
+                <a:schemeClr val="tx1"/>
+              </a:solidFill>
+            </a:ln>
+          </p:spPr>
+          <p:style>
+            <a:lnRef idx="2">
+              <a:schemeClr val="accent1">
+                <a:shade val="50000"/>
+              </a:schemeClr>
+            </a:lnRef>
+            <a:fillRef idx="1">
+              <a:schemeClr val="accent1"/>
+            </a:fillRef>
+            <a:effectRef idx="0">
+              <a:schemeClr val="accent1"/>
+            </a:effectRef>
+            <a:fontRef idx="minor">
+              <a:schemeClr val="lt1"/>
+            </a:fontRef>
+          </p:style>
+          <p:txBody>
+            <a:bodyPr rtlCol="0" anchor="ctr"/>
+            <a:lstStyle/>
+            <a:p>
+              <a:pPr algn="ctr"/>
+              <a:endParaRPr lang="en-US" sz="1200">
+                <a:solidFill>
+                  <a:schemeClr val="tx1"/>
+                </a:solidFill>
+                <a:latin typeface="Avenir Book" panose="02000503020000020003" pitchFamily="2" charset="0"/>
+                <a:cs typeface="Arial" panose="020B0604020202020204" pitchFamily="34" charset="0"/>
+              </a:endParaRPr>
+            </a:p>
+          </p:txBody>
+        </p:sp>
+        <p:sp>
+          <p:nvSpPr>
+            <p:cNvPr id="166" name="Rectangle 165">
+              <a:extLst>
+                <a:ext uri="{FF2B5EF4-FFF2-40B4-BE49-F238E27FC236}">
+                  <a16:creationId xmlns:a16="http://schemas.microsoft.com/office/drawing/2014/main" id="{F2FB27CC-B65A-D80A-3DE1-DCB26CFD55BD}"/>
+                </a:ext>
+              </a:extLst>
+            </p:cNvPr>
+            <p:cNvSpPr/>
+            <p:nvPr/>
+          </p:nvSpPr>
+          <p:spPr>
+            <a:xfrm>
+              <a:off x="4813947" y="1122058"/>
+              <a:ext cx="85555" cy="90366"/>
+            </a:xfrm>
+            <a:prstGeom prst="rect">
+              <a:avLst/>
+            </a:prstGeom>
+            <a:solidFill>
+              <a:schemeClr val="tx1"/>
+            </a:solidFill>
+            <a:ln w="38100">
+              <a:solidFill>
+                <a:schemeClr val="tx1"/>
+              </a:solidFill>
+            </a:ln>
+          </p:spPr>
+          <p:style>
+            <a:lnRef idx="2">
+              <a:schemeClr val="accent1">
+                <a:shade val="50000"/>
+              </a:schemeClr>
+            </a:lnRef>
+            <a:fillRef idx="1">
+              <a:schemeClr val="accent1"/>
+            </a:fillRef>
+            <a:effectRef idx="0">
+              <a:schemeClr val="accent1"/>
+            </a:effectRef>
+            <a:fontRef idx="minor">
+              <a:schemeClr val="lt1"/>
+            </a:fontRef>
+          </p:style>
+          <p:txBody>
+            <a:bodyPr rtlCol="0" anchor="ctr"/>
+            <a:lstStyle/>
+            <a:p>
+              <a:pPr algn="ctr"/>
+              <a:endParaRPr lang="en-US" sz="1200">
+                <a:latin typeface="Avenir Book" panose="02000503020000020003" pitchFamily="2" charset="0"/>
+                <a:cs typeface="Arial" panose="020B0604020202020204" pitchFamily="34" charset="0"/>
+              </a:endParaRPr>
+            </a:p>
+          </p:txBody>
+        </p:sp>
+        <p:sp>
+          <p:nvSpPr>
+            <p:cNvPr id="167" name="Oval 166">
+              <a:extLst>
+                <a:ext uri="{FF2B5EF4-FFF2-40B4-BE49-F238E27FC236}">
+                  <a16:creationId xmlns:a16="http://schemas.microsoft.com/office/drawing/2014/main" id="{483E03B5-F355-D7FF-D11A-F845D1E66D75}"/>
+                </a:ext>
+              </a:extLst>
+            </p:cNvPr>
+            <p:cNvSpPr/>
+            <p:nvPr/>
+          </p:nvSpPr>
+          <p:spPr>
+            <a:xfrm>
+              <a:off x="5648620" y="1425666"/>
+              <a:ext cx="94110" cy="99403"/>
+            </a:xfrm>
+            <a:prstGeom prst="ellipse">
+              <a:avLst/>
+            </a:prstGeom>
+            <a:solidFill>
+              <a:schemeClr val="bg2">
+                <a:lumMod val="50000"/>
+              </a:schemeClr>
+            </a:solidFill>
+            <a:ln w="38100">
+              <a:solidFill>
+                <a:schemeClr val="bg2">
+                  <a:lumMod val="50000"/>
+                </a:schemeClr>
+              </a:solidFill>
+            </a:ln>
+          </p:spPr>
+          <p:style>
+            <a:lnRef idx="2">
+              <a:schemeClr val="accent1">
+                <a:shade val="50000"/>
+              </a:schemeClr>
+            </a:lnRef>
+            <a:fillRef idx="1">
+              <a:schemeClr val="accent1"/>
+            </a:fillRef>
+            <a:effectRef idx="0">
+              <a:schemeClr val="accent1"/>
+            </a:effectRef>
+            <a:fontRef idx="minor">
+              <a:schemeClr val="lt1"/>
+            </a:fontRef>
+          </p:style>
+          <p:txBody>
+            <a:bodyPr rtlCol="0" anchor="ctr"/>
+            <a:lstStyle/>
+            <a:p>
+              <a:pPr algn="ctr"/>
+              <a:endParaRPr lang="en-US" sz="1200">
+                <a:latin typeface="Avenir Book" panose="02000503020000020003" pitchFamily="2" charset="0"/>
+                <a:cs typeface="Arial" panose="020B0604020202020204" pitchFamily="34" charset="0"/>
+              </a:endParaRPr>
+            </a:p>
+          </p:txBody>
+        </p:sp>
+        <p:sp>
+          <p:nvSpPr>
+            <p:cNvPr id="169" name="Rectangle 168">
+              <a:extLst>
+                <a:ext uri="{FF2B5EF4-FFF2-40B4-BE49-F238E27FC236}">
+                  <a16:creationId xmlns:a16="http://schemas.microsoft.com/office/drawing/2014/main" id="{62B099FB-9E24-2879-5BCD-D01B5A280F9E}"/>
+                </a:ext>
+              </a:extLst>
+            </p:cNvPr>
+            <p:cNvSpPr/>
+            <p:nvPr/>
+          </p:nvSpPr>
+          <p:spPr>
+            <a:xfrm>
+              <a:off x="5652898" y="1789065"/>
+              <a:ext cx="85555" cy="90366"/>
+            </a:xfrm>
+            <a:prstGeom prst="rect">
+              <a:avLst/>
+            </a:prstGeom>
+            <a:solidFill>
+              <a:schemeClr val="tx1"/>
+            </a:solidFill>
+            <a:ln w="38100">
+              <a:solidFill>
+                <a:schemeClr val="tx1"/>
+              </a:solidFill>
+            </a:ln>
+          </p:spPr>
+          <p:style>
+            <a:lnRef idx="2">
+              <a:schemeClr val="accent1">
+                <a:shade val="50000"/>
+              </a:schemeClr>
+            </a:lnRef>
+            <a:fillRef idx="1">
+              <a:schemeClr val="accent1"/>
+            </a:fillRef>
+            <a:effectRef idx="0">
+              <a:schemeClr val="accent1"/>
+            </a:effectRef>
+            <a:fontRef idx="minor">
+              <a:schemeClr val="lt1"/>
+            </a:fontRef>
+          </p:style>
+          <p:txBody>
+            <a:bodyPr rtlCol="0" anchor="ctr"/>
+            <a:lstStyle/>
+            <a:p>
+              <a:pPr algn="ctr"/>
+              <a:endParaRPr lang="en-US" sz="1200">
+                <a:latin typeface="Avenir Book" panose="02000503020000020003" pitchFamily="2" charset="0"/>
+                <a:cs typeface="Arial" panose="020B0604020202020204" pitchFamily="34" charset="0"/>
+              </a:endParaRPr>
+            </a:p>
+          </p:txBody>
+        </p:sp>
+        <p:sp>
+          <p:nvSpPr>
+            <p:cNvPr id="170" name="Oval 169">
+              <a:extLst>
+                <a:ext uri="{FF2B5EF4-FFF2-40B4-BE49-F238E27FC236}">
+                  <a16:creationId xmlns:a16="http://schemas.microsoft.com/office/drawing/2014/main" id="{A83FF2A3-C8C8-CC7C-11BA-BFCCA833DA7C}"/>
+                </a:ext>
+              </a:extLst>
+            </p:cNvPr>
+            <p:cNvSpPr/>
+            <p:nvPr/>
+          </p:nvSpPr>
+          <p:spPr>
+            <a:xfrm>
+              <a:off x="4969793" y="1117540"/>
+              <a:ext cx="94110" cy="99403"/>
+            </a:xfrm>
+            <a:prstGeom prst="ellipse">
+              <a:avLst/>
+            </a:prstGeom>
+            <a:solidFill>
+              <a:schemeClr val="bg2">
+                <a:lumMod val="50000"/>
+              </a:schemeClr>
+            </a:solidFill>
+            <a:ln w="38100">
+              <a:solidFill>
+                <a:schemeClr val="bg2">
+                  <a:lumMod val="50000"/>
+                </a:schemeClr>
+              </a:solidFill>
+            </a:ln>
+          </p:spPr>
+          <p:style>
+            <a:lnRef idx="2">
+              <a:schemeClr val="accent1">
+                <a:shade val="50000"/>
+              </a:schemeClr>
+            </a:lnRef>
+            <a:fillRef idx="1">
+              <a:schemeClr val="accent1"/>
+            </a:fillRef>
+            <a:effectRef idx="0">
+              <a:schemeClr val="accent1"/>
+            </a:effectRef>
+            <a:fontRef idx="minor">
+              <a:schemeClr val="lt1"/>
+            </a:fontRef>
+          </p:style>
+          <p:txBody>
+            <a:bodyPr rtlCol="0" anchor="ctr"/>
+            <a:lstStyle/>
+            <a:p>
+              <a:pPr algn="ctr"/>
+              <a:endParaRPr lang="en-US" sz="1200">
+                <a:latin typeface="Avenir Book" panose="02000503020000020003" pitchFamily="2" charset="0"/>
+                <a:cs typeface="Arial" panose="020B0604020202020204" pitchFamily="34" charset="0"/>
+              </a:endParaRPr>
+            </a:p>
+          </p:txBody>
+        </p:sp>
+        <p:cxnSp>
+          <p:nvCxnSpPr>
+            <p:cNvPr id="178" name="Straight Connector 177">
+              <a:extLst>
+                <a:ext uri="{FF2B5EF4-FFF2-40B4-BE49-F238E27FC236}">
+                  <a16:creationId xmlns:a16="http://schemas.microsoft.com/office/drawing/2014/main" id="{8DB5A63D-2B55-C81A-B22B-6133401B3241}"/>
+                </a:ext>
+              </a:extLst>
+            </p:cNvPr>
+            <p:cNvCxnSpPr>
+              <a:cxnSpLocks/>
+              <a:stCxn id="166" idx="3"/>
+              <a:endCxn id="169" idx="1"/>
+            </p:cNvCxnSpPr>
+            <p:nvPr/>
+          </p:nvCxnSpPr>
+          <p:spPr>
+            <a:xfrm>
+              <a:off x="4899502" y="1167241"/>
+              <a:ext cx="753396" cy="667007"/>
+            </a:xfrm>
+            <a:prstGeom prst="line">
+              <a:avLst/>
+            </a:prstGeom>
+            <a:ln w="28575">
+              <a:solidFill>
+                <a:schemeClr val="tx1"/>
+              </a:solidFill>
+            </a:ln>
+          </p:spPr>
+          <p:style>
+            <a:lnRef idx="1">
+              <a:schemeClr val="accent1"/>
+            </a:lnRef>
+            <a:fillRef idx="0">
+              <a:schemeClr val="accent1"/>
+            </a:fillRef>
+            <a:effectRef idx="0">
+              <a:schemeClr val="accent1"/>
+            </a:effectRef>
+            <a:fontRef idx="minor">
+              <a:schemeClr val="tx1"/>
+            </a:fontRef>
+          </p:style>
+        </p:cxnSp>
+        <p:cxnSp>
+          <p:nvCxnSpPr>
+            <p:cNvPr id="180" name="Straight Connector 179">
+              <a:extLst>
+                <a:ext uri="{FF2B5EF4-FFF2-40B4-BE49-F238E27FC236}">
+                  <a16:creationId xmlns:a16="http://schemas.microsoft.com/office/drawing/2014/main" id="{5DC138E9-2016-D141-23AD-8A210A8F3AD2}"/>
+                </a:ext>
+              </a:extLst>
+            </p:cNvPr>
+            <p:cNvCxnSpPr>
+              <a:cxnSpLocks/>
+              <a:stCxn id="170" idx="6"/>
+              <a:endCxn id="167" idx="2"/>
+            </p:cNvCxnSpPr>
+            <p:nvPr/>
+          </p:nvCxnSpPr>
+          <p:spPr>
+            <a:xfrm>
+              <a:off x="5063903" y="1167242"/>
+              <a:ext cx="584717" cy="308126"/>
+            </a:xfrm>
+            <a:prstGeom prst="line">
+              <a:avLst/>
+            </a:prstGeom>
+            <a:ln w="28575">
+              <a:solidFill>
+                <a:schemeClr val="bg2">
+                  <a:lumMod val="50000"/>
+                </a:schemeClr>
+              </a:solidFill>
+            </a:ln>
+          </p:spPr>
+          <p:style>
+            <a:lnRef idx="1">
+              <a:schemeClr val="accent1"/>
+            </a:lnRef>
+            <a:fillRef idx="0">
+              <a:schemeClr val="accent1"/>
+            </a:fillRef>
+            <a:effectRef idx="0">
+              <a:schemeClr val="accent1"/>
+            </a:effectRef>
+            <a:fontRef idx="minor">
+              <a:schemeClr val="tx1"/>
+            </a:fontRef>
+          </p:style>
+        </p:cxnSp>
+        <p:sp>
+          <p:nvSpPr>
+            <p:cNvPr id="195" name="TextBox 194">
+              <a:extLst>
+                <a:ext uri="{FF2B5EF4-FFF2-40B4-BE49-F238E27FC236}">
+                  <a16:creationId xmlns:a16="http://schemas.microsoft.com/office/drawing/2014/main" id="{DEDDD5C5-5B46-3FCF-9979-9033F24C9549}"/>
+                </a:ext>
+              </a:extLst>
+            </p:cNvPr>
+            <p:cNvSpPr txBox="1"/>
+            <p:nvPr/>
+          </p:nvSpPr>
+          <p:spPr>
+            <a:xfrm>
+              <a:off x="4605340" y="812259"/>
+              <a:ext cx="276038" cy="276999"/>
+            </a:xfrm>
+            <a:prstGeom prst="rect">
+              <a:avLst/>
+            </a:prstGeom>
+            <a:noFill/>
+          </p:spPr>
+          <p:txBody>
+            <a:bodyPr wrap="none" rtlCol="0">
+              <a:spAutoFit/>
+            </a:bodyPr>
+            <a:lstStyle/>
+            <a:p>
+              <a:r>
+                <a:rPr lang="en-US" sz="1200" dirty="0">
+                  <a:latin typeface="Avenir Book" panose="02000503020000020003" pitchFamily="2" charset="0"/>
+                </a:rPr>
+                <a:t>E</a:t>
+              </a:r>
+            </a:p>
+          </p:txBody>
+        </p:sp>
+      </p:grpSp>
+      <p:sp>
+        <p:nvSpPr>
+          <p:cNvPr id="71" name="TextBox 70">
+            <a:extLst>
+              <a:ext uri="{FF2B5EF4-FFF2-40B4-BE49-F238E27FC236}">
+                <a16:creationId xmlns:a16="http://schemas.microsoft.com/office/drawing/2014/main" id="{509F67DD-4ABF-5B1F-C7E6-B90D9DBF81BD}"/>
+              </a:ext>
+            </a:extLst>
+          </p:cNvPr>
+          <p:cNvSpPr txBox="1"/>
+          <p:nvPr/>
+        </p:nvSpPr>
+        <p:spPr>
+          <a:xfrm>
+            <a:off x="4719348" y="3419359"/>
+            <a:ext cx="381836" cy="276999"/>
+          </a:xfrm>
+          <a:prstGeom prst="rect">
+            <a:avLst/>
+          </a:prstGeom>
+          <a:noFill/>
+        </p:spPr>
+        <p:txBody>
+          <a:bodyPr wrap="none" rtlCol="0">
+            <a:spAutoFit/>
+          </a:bodyPr>
+          <a:lstStyle/>
+          <a:p>
+            <a:r>
+              <a:rPr lang="en-US" sz="1200" dirty="0">
+                <a:latin typeface="Avenir Book" panose="02000503020000020003" pitchFamily="2" charset="0"/>
+              </a:rPr>
+              <a:t>CT</a:t>
+            </a:r>
+          </a:p>
+        </p:txBody>
+      </p:sp>
+      <p:sp>
+        <p:nvSpPr>
+          <p:cNvPr id="86" name="TextBox 85">
+            <a:extLst>
+              <a:ext uri="{FF2B5EF4-FFF2-40B4-BE49-F238E27FC236}">
+                <a16:creationId xmlns:a16="http://schemas.microsoft.com/office/drawing/2014/main" id="{245F0E25-4967-EBC5-1D6D-9AC198BB9AA8}"/>
+              </a:ext>
+            </a:extLst>
+          </p:cNvPr>
+          <p:cNvSpPr txBox="1"/>
+          <p:nvPr/>
+        </p:nvSpPr>
+        <p:spPr>
+          <a:xfrm>
+            <a:off x="5506027" y="3419359"/>
+            <a:ext cx="357790" cy="276999"/>
+          </a:xfrm>
+          <a:prstGeom prst="rect">
+            <a:avLst/>
+          </a:prstGeom>
+          <a:noFill/>
+        </p:spPr>
+        <p:txBody>
+          <a:bodyPr wrap="none" rtlCol="0">
+            <a:spAutoFit/>
+          </a:bodyPr>
+          <a:lstStyle/>
+          <a:p>
+            <a:r>
+              <a:rPr lang="en-US" sz="1200" dirty="0">
+                <a:latin typeface="Avenir Book" panose="02000503020000020003" pitchFamily="2" charset="0"/>
+              </a:rPr>
+              <a:t>FT</a:t>
+            </a:r>
+          </a:p>
+        </p:txBody>
+      </p:sp>
+      <p:grpSp>
+        <p:nvGrpSpPr>
+          <p:cNvPr id="214" name="Group 213">
+            <a:extLst>
+              <a:ext uri="{FF2B5EF4-FFF2-40B4-BE49-F238E27FC236}">
+                <a16:creationId xmlns:a16="http://schemas.microsoft.com/office/drawing/2014/main" id="{EEBC9DE8-1741-A320-F7F0-FC9A6550E5B1}"/>
+              </a:ext>
+            </a:extLst>
+          </p:cNvPr>
+          <p:cNvGrpSpPr/>
+          <p:nvPr/>
+        </p:nvGrpSpPr>
+        <p:grpSpPr>
+          <a:xfrm>
+            <a:off x="4595793" y="2160546"/>
+            <a:ext cx="1339303" cy="1261851"/>
+            <a:chOff x="4595793" y="2160546"/>
+            <a:chExt cx="1339303" cy="1261851"/>
+          </a:xfrm>
+        </p:grpSpPr>
+        <p:sp>
+          <p:nvSpPr>
+            <p:cNvPr id="171" name="Half Frame 170">
+              <a:extLst>
+                <a:ext uri="{FF2B5EF4-FFF2-40B4-BE49-F238E27FC236}">
+                  <a16:creationId xmlns:a16="http://schemas.microsoft.com/office/drawing/2014/main" id="{38208444-E5FA-455B-6CF5-3127A1549A76}"/>
+                </a:ext>
+              </a:extLst>
+            </p:cNvPr>
+            <p:cNvSpPr/>
+            <p:nvPr/>
+          </p:nvSpPr>
+          <p:spPr>
+            <a:xfrm rot="16200000">
+              <a:off x="4648274" y="2135574"/>
+              <a:ext cx="1234342" cy="1339303"/>
+            </a:xfrm>
+            <a:prstGeom prst="halfFrame">
+              <a:avLst>
+                <a:gd name="adj1" fmla="val 239"/>
+                <a:gd name="adj2" fmla="val 239"/>
+              </a:avLst>
+            </a:prstGeom>
+            <a:solidFill>
+              <a:schemeClr val="tx1"/>
+            </a:solidFill>
+            <a:ln>
+              <a:solidFill>
+                <a:schemeClr val="tx1"/>
+              </a:solidFill>
+            </a:ln>
+          </p:spPr>
+          <p:style>
+            <a:lnRef idx="2">
+              <a:schemeClr val="accent1">
+                <a:shade val="50000"/>
+              </a:schemeClr>
+            </a:lnRef>
+            <a:fillRef idx="1">
+              <a:schemeClr val="accent1"/>
+            </a:fillRef>
+            <a:effectRef idx="0">
+              <a:schemeClr val="accent1"/>
+            </a:effectRef>
+            <a:fontRef idx="minor">
+              <a:schemeClr val="lt1"/>
+            </a:fontRef>
+          </p:style>
+          <p:txBody>
+            <a:bodyPr rtlCol="0" anchor="ctr"/>
+            <a:lstStyle/>
+            <a:p>
+              <a:pPr algn="ctr"/>
+              <a:endParaRPr lang="en-US" sz="1200">
+                <a:solidFill>
+                  <a:schemeClr val="tx1"/>
+                </a:solidFill>
+                <a:latin typeface="Avenir Book" panose="02000503020000020003" pitchFamily="2" charset="0"/>
+                <a:cs typeface="Arial" panose="020B0604020202020204" pitchFamily="34" charset="0"/>
+              </a:endParaRPr>
+            </a:p>
+          </p:txBody>
+        </p:sp>
+        <p:sp>
+          <p:nvSpPr>
+            <p:cNvPr id="173" name="Rectangle 172">
+              <a:extLst>
+                <a:ext uri="{FF2B5EF4-FFF2-40B4-BE49-F238E27FC236}">
+                  <a16:creationId xmlns:a16="http://schemas.microsoft.com/office/drawing/2014/main" id="{264B86B6-DE74-31EF-B947-3155131DFB4F}"/>
+                </a:ext>
+              </a:extLst>
+            </p:cNvPr>
+            <p:cNvSpPr/>
+            <p:nvPr/>
+          </p:nvSpPr>
+          <p:spPr>
+            <a:xfrm>
+              <a:off x="5037513" y="2499100"/>
+              <a:ext cx="85555" cy="90366"/>
+            </a:xfrm>
+            <a:prstGeom prst="rect">
+              <a:avLst/>
+            </a:prstGeom>
+            <a:solidFill>
+              <a:schemeClr val="tx1"/>
+            </a:solidFill>
+            <a:ln w="38100">
+              <a:solidFill>
+                <a:schemeClr val="tx1"/>
+              </a:solidFill>
+            </a:ln>
+          </p:spPr>
+          <p:style>
+            <a:lnRef idx="2">
+              <a:schemeClr val="accent1">
+                <a:shade val="50000"/>
+              </a:schemeClr>
+            </a:lnRef>
+            <a:fillRef idx="1">
+              <a:schemeClr val="accent1"/>
+            </a:fillRef>
+            <a:effectRef idx="0">
+              <a:schemeClr val="accent1"/>
+            </a:effectRef>
+            <a:fontRef idx="minor">
+              <a:schemeClr val="lt1"/>
+            </a:fontRef>
+          </p:style>
+          <p:txBody>
+            <a:bodyPr rtlCol="0" anchor="ctr"/>
+            <a:lstStyle/>
+            <a:p>
+              <a:pPr algn="ctr"/>
+              <a:endParaRPr lang="en-US" sz="1200">
+                <a:latin typeface="Avenir Book" panose="02000503020000020003" pitchFamily="2" charset="0"/>
+                <a:cs typeface="Arial" panose="020B0604020202020204" pitchFamily="34" charset="0"/>
+              </a:endParaRPr>
+            </a:p>
+          </p:txBody>
+        </p:sp>
+        <p:sp>
+          <p:nvSpPr>
+            <p:cNvPr id="174" name="Oval 173">
+              <a:extLst>
+                <a:ext uri="{FF2B5EF4-FFF2-40B4-BE49-F238E27FC236}">
+                  <a16:creationId xmlns:a16="http://schemas.microsoft.com/office/drawing/2014/main" id="{31E3E47C-F3DE-C56F-11F3-34A63B883743}"/>
+                </a:ext>
+              </a:extLst>
+            </p:cNvPr>
+            <p:cNvSpPr/>
+            <p:nvPr/>
+          </p:nvSpPr>
+          <p:spPr>
+            <a:xfrm>
+              <a:off x="5648518" y="3073753"/>
+              <a:ext cx="94111" cy="99403"/>
+            </a:xfrm>
+            <a:prstGeom prst="ellipse">
+              <a:avLst/>
+            </a:prstGeom>
+            <a:solidFill>
+              <a:schemeClr val="bg2">
+                <a:lumMod val="50000"/>
+              </a:schemeClr>
+            </a:solidFill>
+            <a:ln w="38100">
+              <a:solidFill>
+                <a:schemeClr val="bg2">
+                  <a:lumMod val="50000"/>
+                </a:schemeClr>
+              </a:solidFill>
+            </a:ln>
+          </p:spPr>
+          <p:style>
+            <a:lnRef idx="2">
+              <a:schemeClr val="accent1">
+                <a:shade val="50000"/>
+              </a:schemeClr>
+            </a:lnRef>
+            <a:fillRef idx="1">
+              <a:schemeClr val="accent1"/>
+            </a:fillRef>
+            <a:effectRef idx="0">
+              <a:schemeClr val="accent1"/>
+            </a:effectRef>
+            <a:fontRef idx="minor">
+              <a:schemeClr val="lt1"/>
+            </a:fontRef>
+          </p:style>
+          <p:txBody>
+            <a:bodyPr rtlCol="0" anchor="ctr"/>
+            <a:lstStyle/>
+            <a:p>
+              <a:pPr algn="ctr"/>
+              <a:endParaRPr lang="en-US" sz="1200">
+                <a:latin typeface="Avenir Book" panose="02000503020000020003" pitchFamily="2" charset="0"/>
+                <a:cs typeface="Arial" panose="020B0604020202020204" pitchFamily="34" charset="0"/>
+              </a:endParaRPr>
+            </a:p>
+          </p:txBody>
+        </p:sp>
+        <p:sp>
+          <p:nvSpPr>
+            <p:cNvPr id="176" name="Rectangle 175">
+              <a:extLst>
+                <a:ext uri="{FF2B5EF4-FFF2-40B4-BE49-F238E27FC236}">
+                  <a16:creationId xmlns:a16="http://schemas.microsoft.com/office/drawing/2014/main" id="{B71FC731-4AEC-8EAB-43D9-F7E7742EEFE6}"/>
+                </a:ext>
+              </a:extLst>
+            </p:cNvPr>
+            <p:cNvSpPr/>
+            <p:nvPr/>
+          </p:nvSpPr>
+          <p:spPr>
+            <a:xfrm>
+              <a:off x="5652796" y="2756264"/>
+              <a:ext cx="85555" cy="90366"/>
+            </a:xfrm>
+            <a:prstGeom prst="rect">
+              <a:avLst/>
+            </a:prstGeom>
+            <a:solidFill>
+              <a:schemeClr val="tx1"/>
+            </a:solidFill>
+            <a:ln w="38100">
+              <a:solidFill>
+                <a:schemeClr val="tx1"/>
+              </a:solidFill>
+            </a:ln>
+          </p:spPr>
+          <p:style>
+            <a:lnRef idx="2">
+              <a:schemeClr val="accent1">
+                <a:shade val="50000"/>
+              </a:schemeClr>
+            </a:lnRef>
+            <a:fillRef idx="1">
+              <a:schemeClr val="accent1"/>
+            </a:fillRef>
+            <a:effectRef idx="0">
+              <a:schemeClr val="accent1"/>
+            </a:effectRef>
+            <a:fontRef idx="minor">
+              <a:schemeClr val="lt1"/>
+            </a:fontRef>
+          </p:style>
+          <p:txBody>
+            <a:bodyPr rtlCol="0" anchor="ctr"/>
+            <a:lstStyle/>
+            <a:p>
+              <a:pPr algn="ctr"/>
+              <a:endParaRPr lang="en-US" sz="1200">
+                <a:latin typeface="Avenir Book" panose="02000503020000020003" pitchFamily="2" charset="0"/>
+                <a:cs typeface="Arial" panose="020B0604020202020204" pitchFamily="34" charset="0"/>
+              </a:endParaRPr>
+            </a:p>
+          </p:txBody>
+        </p:sp>
+        <p:sp>
+          <p:nvSpPr>
+            <p:cNvPr id="177" name="Oval 176">
+              <a:extLst>
+                <a:ext uri="{FF2B5EF4-FFF2-40B4-BE49-F238E27FC236}">
+                  <a16:creationId xmlns:a16="http://schemas.microsoft.com/office/drawing/2014/main" id="{851CFE94-501C-B0C0-D519-3C7A0562507F}"/>
+                </a:ext>
+              </a:extLst>
+            </p:cNvPr>
+            <p:cNvSpPr/>
+            <p:nvPr/>
+          </p:nvSpPr>
+          <p:spPr>
+            <a:xfrm>
+              <a:off x="4864778" y="2488328"/>
+              <a:ext cx="94111" cy="99403"/>
+            </a:xfrm>
+            <a:prstGeom prst="ellipse">
+              <a:avLst/>
+            </a:prstGeom>
+            <a:solidFill>
+              <a:schemeClr val="bg2">
+                <a:lumMod val="50000"/>
+              </a:schemeClr>
+            </a:solidFill>
+            <a:ln w="38100">
+              <a:solidFill>
+                <a:schemeClr val="bg2">
+                  <a:lumMod val="50000"/>
+                </a:schemeClr>
+              </a:solidFill>
+            </a:ln>
+          </p:spPr>
+          <p:style>
+            <a:lnRef idx="2">
+              <a:schemeClr val="accent1">
+                <a:shade val="50000"/>
+              </a:schemeClr>
+            </a:lnRef>
+            <a:fillRef idx="1">
+              <a:schemeClr val="accent1"/>
+            </a:fillRef>
+            <a:effectRef idx="0">
+              <a:schemeClr val="accent1"/>
+            </a:effectRef>
+            <a:fontRef idx="minor">
+              <a:schemeClr val="lt1"/>
+            </a:fontRef>
+          </p:style>
+          <p:txBody>
+            <a:bodyPr rtlCol="0" anchor="ctr"/>
+            <a:lstStyle/>
+            <a:p>
+              <a:pPr algn="ctr"/>
+              <a:endParaRPr lang="en-US" sz="1200">
+                <a:latin typeface="Avenir Book" panose="02000503020000020003" pitchFamily="2" charset="0"/>
+                <a:cs typeface="Arial" panose="020B0604020202020204" pitchFamily="34" charset="0"/>
+              </a:endParaRPr>
+            </a:p>
+          </p:txBody>
+        </p:sp>
+        <p:cxnSp>
+          <p:nvCxnSpPr>
+            <p:cNvPr id="181" name="Straight Connector 180">
+              <a:extLst>
+                <a:ext uri="{FF2B5EF4-FFF2-40B4-BE49-F238E27FC236}">
+                  <a16:creationId xmlns:a16="http://schemas.microsoft.com/office/drawing/2014/main" id="{4C101AB5-E400-8EBA-7C31-62CBBF84A0C7}"/>
+                </a:ext>
+              </a:extLst>
+            </p:cNvPr>
+            <p:cNvCxnSpPr>
+              <a:stCxn id="173" idx="3"/>
+              <a:endCxn id="176" idx="1"/>
+            </p:cNvCxnSpPr>
+            <p:nvPr/>
+          </p:nvCxnSpPr>
+          <p:spPr>
+            <a:xfrm>
+              <a:off x="5123068" y="2544283"/>
+              <a:ext cx="529728" cy="257164"/>
+            </a:xfrm>
+            <a:prstGeom prst="line">
+              <a:avLst/>
+            </a:prstGeom>
+            <a:ln w="28575">
+              <a:solidFill>
+                <a:schemeClr val="tx1"/>
+              </a:solidFill>
+            </a:ln>
+          </p:spPr>
+          <p:style>
+            <a:lnRef idx="1">
+              <a:schemeClr val="accent1"/>
+            </a:lnRef>
+            <a:fillRef idx="0">
+              <a:schemeClr val="accent1"/>
+            </a:fillRef>
+            <a:effectRef idx="0">
+              <a:schemeClr val="accent1"/>
+            </a:effectRef>
+            <a:fontRef idx="minor">
+              <a:schemeClr val="tx1"/>
+            </a:fontRef>
+          </p:style>
+        </p:cxnSp>
+        <p:cxnSp>
+          <p:nvCxnSpPr>
+            <p:cNvPr id="183" name="Straight Connector 182">
+              <a:extLst>
+                <a:ext uri="{FF2B5EF4-FFF2-40B4-BE49-F238E27FC236}">
+                  <a16:creationId xmlns:a16="http://schemas.microsoft.com/office/drawing/2014/main" id="{8D848F7E-2BD8-EBA2-2D7D-8710FFAC8192}"/>
+                </a:ext>
+              </a:extLst>
+            </p:cNvPr>
+            <p:cNvCxnSpPr>
+              <a:cxnSpLocks/>
+              <a:stCxn id="177" idx="5"/>
+              <a:endCxn id="174" idx="2"/>
+            </p:cNvCxnSpPr>
+            <p:nvPr/>
+          </p:nvCxnSpPr>
+          <p:spPr>
+            <a:xfrm>
+              <a:off x="4945107" y="2573174"/>
+              <a:ext cx="703411" cy="550281"/>
+            </a:xfrm>
+            <a:prstGeom prst="line">
+              <a:avLst/>
+            </a:prstGeom>
+            <a:ln w="28575">
+              <a:solidFill>
+                <a:schemeClr val="tx1">
+                  <a:lumMod val="50000"/>
+                  <a:lumOff val="50000"/>
+                </a:schemeClr>
+              </a:solidFill>
+            </a:ln>
+          </p:spPr>
+          <p:style>
+            <a:lnRef idx="1">
+              <a:schemeClr val="accent1"/>
+            </a:lnRef>
+            <a:fillRef idx="0">
+              <a:schemeClr val="accent1"/>
+            </a:fillRef>
+            <a:effectRef idx="0">
+              <a:schemeClr val="accent1"/>
+            </a:effectRef>
+            <a:fontRef idx="minor">
+              <a:schemeClr val="tx1"/>
+            </a:fontRef>
+          </p:style>
+        </p:cxnSp>
+        <p:sp>
+          <p:nvSpPr>
+            <p:cNvPr id="196" name="TextBox 195">
+              <a:extLst>
+                <a:ext uri="{FF2B5EF4-FFF2-40B4-BE49-F238E27FC236}">
+                  <a16:creationId xmlns:a16="http://schemas.microsoft.com/office/drawing/2014/main" id="{F559FEF5-665A-F26F-E0A4-B8863880DE45}"/>
+                </a:ext>
+              </a:extLst>
+            </p:cNvPr>
+            <p:cNvSpPr txBox="1"/>
+            <p:nvPr/>
+          </p:nvSpPr>
+          <p:spPr>
+            <a:xfrm>
+              <a:off x="4639371" y="2160546"/>
+              <a:ext cx="269626" cy="276999"/>
+            </a:xfrm>
+            <a:prstGeom prst="rect">
+              <a:avLst/>
+            </a:prstGeom>
+            <a:noFill/>
+          </p:spPr>
+          <p:txBody>
+            <a:bodyPr wrap="none" rtlCol="0">
+              <a:spAutoFit/>
+            </a:bodyPr>
+            <a:lstStyle/>
+            <a:p>
+              <a:r>
+                <a:rPr lang="en-US" sz="1200" dirty="0">
+                  <a:latin typeface="Avenir Book" panose="02000503020000020003" pitchFamily="2" charset="0"/>
+                </a:rPr>
+                <a:t>F</a:t>
+              </a:r>
+            </a:p>
+          </p:txBody>
+        </p:sp>
+      </p:grpSp>
+    </p:spTree>
+    <p:extLst>
+      <p:ext uri="{BB962C8B-B14F-4D97-AF65-F5344CB8AC3E}">
+        <p14:creationId xmlns:p14="http://schemas.microsoft.com/office/powerpoint/2010/main" val="3819731617"/>
+      </p:ext>
+    </p:extLst>
+  </p:cSld>
+  <p:clrMapOvr>
+    <a:masterClrMapping/>
+  </p:clrMapOvr>
+</p:sld>
+</file>
+
 <file path=ppt/theme/theme1.xml><?xml version="1.0" encoding="utf-8"?>
 <a:theme xmlns:a="http://schemas.openxmlformats.org/drawingml/2006/main" name="Office Theme">
   <a:themeElements>

</xml_diff>